<commit_message>
updated figs for present
</commit_message>
<xml_diff>
--- a/figures/TBL/tbl1.pptx
+++ b/figures/TBL/tbl1.pptx
@@ -2,12 +2,12 @@
 <file path=ppt/presentation.xml><?xml version="1.0" encoding="utf-8"?>
 <p:presentation xmlns:a="http://schemas.openxmlformats.org/drawingml/2006/main" xmlns:r="http://schemas.openxmlformats.org/officeDocument/2006/relationships" xmlns:p="http://schemas.openxmlformats.org/presentationml/2006/main" saveSubsetFonts="1" autoCompressPictures="0">
   <p:sldMasterIdLst>
-    <p:sldMasterId id="2147483648" r:id="rId1"/>
+    <p:sldMasterId id="2147483672" r:id="rId1"/>
   </p:sldMasterIdLst>
   <p:sldIdLst>
     <p:sldId id="257" r:id="rId2"/>
   </p:sldIdLst>
-  <p:sldSz cx="12192000" cy="6858000"/>
+  <p:sldSz cx="10972800" cy="3657600"/>
   <p:notesSz cx="6858000" cy="9144000"/>
   <p:defaultTextStyle>
     <a:defPPr>
@@ -141,15 +141,15 @@
         </p:nvSpPr>
         <p:spPr>
           <a:xfrm>
-            <a:off x="1524000" y="1122363"/>
-            <a:ext cx="9144000" cy="2387600"/>
+            <a:off x="1371600" y="598593"/>
+            <a:ext cx="8229600" cy="1273387"/>
           </a:xfrm>
         </p:spPr>
         <p:txBody>
           <a:bodyPr anchor="b"/>
           <a:lstStyle>
             <a:lvl1pPr algn="ctr">
-              <a:defRPr sz="6000"/>
+              <a:defRPr sz="3200"/>
             </a:lvl1pPr>
           </a:lstStyle>
           <a:p>
@@ -157,7 +157,7 @@
               <a:rPr lang="en-US" smtClean="0"/>
               <a:t>Click to edit Master title style</a:t>
             </a:r>
-            <a:endParaRPr lang="en-US"/>
+            <a:endParaRPr lang="en-US" dirty="0"/>
           </a:p>
         </p:txBody>
       </p:sp>
@@ -173,8 +173,8 @@
         </p:nvSpPr>
         <p:spPr>
           <a:xfrm>
-            <a:off x="1524000" y="3602038"/>
-            <a:ext cx="9144000" cy="1655762"/>
+            <a:off x="1371600" y="1921087"/>
+            <a:ext cx="8229600" cy="883073"/>
           </a:xfrm>
         </p:spPr>
         <p:txBody>
@@ -182,39 +182,39 @@
           <a:lstStyle>
             <a:lvl1pPr marL="0" indent="0" algn="ctr">
               <a:buNone/>
-              <a:defRPr sz="2400"/>
+              <a:defRPr sz="1280"/>
             </a:lvl1pPr>
-            <a:lvl2pPr marL="457200" indent="0" algn="ctr">
-              <a:buNone/>
-              <a:defRPr sz="2000"/>
+            <a:lvl2pPr marL="243825" indent="0" algn="ctr">
+              <a:buNone/>
+              <a:defRPr sz="1067"/>
             </a:lvl2pPr>
-            <a:lvl3pPr marL="914400" indent="0" algn="ctr">
-              <a:buNone/>
-              <a:defRPr sz="1800"/>
+            <a:lvl3pPr marL="487650" indent="0" algn="ctr">
+              <a:buNone/>
+              <a:defRPr sz="960"/>
             </a:lvl3pPr>
-            <a:lvl4pPr marL="1371600" indent="0" algn="ctr">
-              <a:buNone/>
-              <a:defRPr sz="1600"/>
+            <a:lvl4pPr marL="731474" indent="0" algn="ctr">
+              <a:buNone/>
+              <a:defRPr sz="853"/>
             </a:lvl4pPr>
-            <a:lvl5pPr marL="1828800" indent="0" algn="ctr">
-              <a:buNone/>
-              <a:defRPr sz="1600"/>
+            <a:lvl5pPr marL="975299" indent="0" algn="ctr">
+              <a:buNone/>
+              <a:defRPr sz="853"/>
             </a:lvl5pPr>
-            <a:lvl6pPr marL="2286000" indent="0" algn="ctr">
-              <a:buNone/>
-              <a:defRPr sz="1600"/>
+            <a:lvl6pPr marL="1219124" indent="0" algn="ctr">
+              <a:buNone/>
+              <a:defRPr sz="853"/>
             </a:lvl6pPr>
-            <a:lvl7pPr marL="2743200" indent="0" algn="ctr">
-              <a:buNone/>
-              <a:defRPr sz="1600"/>
+            <a:lvl7pPr marL="1462949" indent="0" algn="ctr">
+              <a:buNone/>
+              <a:defRPr sz="853"/>
             </a:lvl7pPr>
-            <a:lvl8pPr marL="3200400" indent="0" algn="ctr">
-              <a:buNone/>
-              <a:defRPr sz="1600"/>
+            <a:lvl8pPr marL="1706773" indent="0" algn="ctr">
+              <a:buNone/>
+              <a:defRPr sz="853"/>
             </a:lvl8pPr>
-            <a:lvl9pPr marL="3657600" indent="0" algn="ctr">
-              <a:buNone/>
-              <a:defRPr sz="1600"/>
+            <a:lvl9pPr marL="1950598" indent="0" algn="ctr">
+              <a:buNone/>
+              <a:defRPr sz="853"/>
             </a:lvl9pPr>
           </a:lstStyle>
           <a:p>
@@ -222,7 +222,7 @@
               <a:rPr lang="en-US" smtClean="0"/>
               <a:t>Click to edit Master subtitle style</a:t>
             </a:r>
-            <a:endParaRPr lang="en-US"/>
+            <a:endParaRPr lang="en-US" dirty="0"/>
           </a:p>
         </p:txBody>
       </p:sp>
@@ -243,7 +243,7 @@
           <a:p>
             <a:fld id="{648A3E35-6C1F-AA47-866B-1252AC193DCC}" type="datetimeFigureOut">
               <a:rPr lang="en-US" smtClean="0"/>
-              <a:t>5/6/21</a:t>
+              <a:t>5/10/21</a:t>
             </a:fld>
             <a:endParaRPr lang="en-US"/>
           </a:p>
@@ -292,11 +292,6 @@
         </p:txBody>
       </p:sp>
     </p:spTree>
-    <p:extLst>
-      <p:ext uri="{BB962C8B-B14F-4D97-AF65-F5344CB8AC3E}">
-        <p14:creationId xmlns:p14="http://schemas.microsoft.com/office/powerpoint/2010/main" val="1289436649"/>
-      </p:ext>
-    </p:extLst>
   </p:cSld>
   <p:clrMapOvr>
     <a:masterClrMapping/>
@@ -340,7 +335,7 @@
               <a:rPr lang="en-US" smtClean="0"/>
               <a:t>Click to edit Master title style</a:t>
             </a:r>
-            <a:endParaRPr lang="en-US"/>
+            <a:endParaRPr lang="en-US" dirty="0"/>
           </a:p>
         </p:txBody>
       </p:sp>
@@ -392,7 +387,7 @@
               <a:rPr lang="en-US" smtClean="0"/>
               <a:t>Fifth level</a:t>
             </a:r>
-            <a:endParaRPr lang="en-US"/>
+            <a:endParaRPr lang="en-US" dirty="0"/>
           </a:p>
         </p:txBody>
       </p:sp>
@@ -413,7 +408,7 @@
           <a:p>
             <a:fld id="{648A3E35-6C1F-AA47-866B-1252AC193DCC}" type="datetimeFigureOut">
               <a:rPr lang="en-US" smtClean="0"/>
-              <a:t>5/6/21</a:t>
+              <a:t>5/10/21</a:t>
             </a:fld>
             <a:endParaRPr lang="en-US"/>
           </a:p>
@@ -462,11 +457,6 @@
         </p:txBody>
       </p:sp>
     </p:spTree>
-    <p:extLst>
-      <p:ext uri="{BB962C8B-B14F-4D97-AF65-F5344CB8AC3E}">
-        <p14:creationId xmlns:p14="http://schemas.microsoft.com/office/powerpoint/2010/main" val="471813420"/>
-      </p:ext>
-    </p:extLst>
   </p:cSld>
   <p:clrMapOvr>
     <a:masterClrMapping/>
@@ -503,8 +493,8 @@
         </p:nvSpPr>
         <p:spPr>
           <a:xfrm>
-            <a:off x="8724900" y="365125"/>
-            <a:ext cx="2628900" cy="5811838"/>
+            <a:off x="7852410" y="194733"/>
+            <a:ext cx="2366010" cy="3099647"/>
           </a:xfrm>
         </p:spPr>
         <p:txBody>
@@ -515,7 +505,7 @@
               <a:rPr lang="en-US" smtClean="0"/>
               <a:t>Click to edit Master title style</a:t>
             </a:r>
-            <a:endParaRPr lang="en-US"/>
+            <a:endParaRPr lang="en-US" dirty="0"/>
           </a:p>
         </p:txBody>
       </p:sp>
@@ -531,8 +521,8 @@
         </p:nvSpPr>
         <p:spPr>
           <a:xfrm>
-            <a:off x="838200" y="365125"/>
-            <a:ext cx="7734300" cy="5811838"/>
+            <a:off x="754380" y="194733"/>
+            <a:ext cx="6960870" cy="3099647"/>
           </a:xfrm>
         </p:spPr>
         <p:txBody>
@@ -572,7 +562,7 @@
               <a:rPr lang="en-US" smtClean="0"/>
               <a:t>Fifth level</a:t>
             </a:r>
-            <a:endParaRPr lang="en-US"/>
+            <a:endParaRPr lang="en-US" dirty="0"/>
           </a:p>
         </p:txBody>
       </p:sp>
@@ -593,7 +583,7 @@
           <a:p>
             <a:fld id="{648A3E35-6C1F-AA47-866B-1252AC193DCC}" type="datetimeFigureOut">
               <a:rPr lang="en-US" smtClean="0"/>
-              <a:t>5/6/21</a:t>
+              <a:t>5/10/21</a:t>
             </a:fld>
             <a:endParaRPr lang="en-US"/>
           </a:p>
@@ -642,11 +632,6 @@
         </p:txBody>
       </p:sp>
     </p:spTree>
-    <p:extLst>
-      <p:ext uri="{BB962C8B-B14F-4D97-AF65-F5344CB8AC3E}">
-        <p14:creationId xmlns:p14="http://schemas.microsoft.com/office/powerpoint/2010/main" val="1258525216"/>
-      </p:ext>
-    </p:extLst>
   </p:cSld>
   <p:clrMapOvr>
     <a:masterClrMapping/>
@@ -690,7 +675,7 @@
               <a:rPr lang="en-US" smtClean="0"/>
               <a:t>Click to edit Master title style</a:t>
             </a:r>
-            <a:endParaRPr lang="en-US"/>
+            <a:endParaRPr lang="en-US" dirty="0"/>
           </a:p>
         </p:txBody>
       </p:sp>
@@ -742,7 +727,7 @@
               <a:rPr lang="en-US" smtClean="0"/>
               <a:t>Fifth level</a:t>
             </a:r>
-            <a:endParaRPr lang="en-US"/>
+            <a:endParaRPr lang="en-US" dirty="0"/>
           </a:p>
         </p:txBody>
       </p:sp>
@@ -763,7 +748,7 @@
           <a:p>
             <a:fld id="{648A3E35-6C1F-AA47-866B-1252AC193DCC}" type="datetimeFigureOut">
               <a:rPr lang="en-US" smtClean="0"/>
-              <a:t>5/6/21</a:t>
+              <a:t>5/10/21</a:t>
             </a:fld>
             <a:endParaRPr lang="en-US"/>
           </a:p>
@@ -812,11 +797,6 @@
         </p:txBody>
       </p:sp>
     </p:spTree>
-    <p:extLst>
-      <p:ext uri="{BB962C8B-B14F-4D97-AF65-F5344CB8AC3E}">
-        <p14:creationId xmlns:p14="http://schemas.microsoft.com/office/powerpoint/2010/main" val="1304277866"/>
-      </p:ext>
-    </p:extLst>
   </p:cSld>
   <p:clrMapOvr>
     <a:masterClrMapping/>
@@ -853,15 +833,15 @@
         </p:nvSpPr>
         <p:spPr>
           <a:xfrm>
-            <a:off x="831850" y="1709738"/>
-            <a:ext cx="10515600" cy="2852737"/>
+            <a:off x="748665" y="911860"/>
+            <a:ext cx="9464040" cy="1521460"/>
           </a:xfrm>
         </p:spPr>
         <p:txBody>
           <a:bodyPr anchor="b"/>
           <a:lstStyle>
             <a:lvl1pPr>
-              <a:defRPr sz="6000"/>
+              <a:defRPr sz="3200"/>
             </a:lvl1pPr>
           </a:lstStyle>
           <a:p>
@@ -869,7 +849,7 @@
               <a:rPr lang="en-US" smtClean="0"/>
               <a:t>Click to edit Master title style</a:t>
             </a:r>
-            <a:endParaRPr lang="en-US"/>
+            <a:endParaRPr lang="en-US" dirty="0"/>
           </a:p>
         </p:txBody>
       </p:sp>
@@ -885,8 +865,8 @@
         </p:nvSpPr>
         <p:spPr>
           <a:xfrm>
-            <a:off x="831850" y="4589463"/>
-            <a:ext cx="10515600" cy="1500187"/>
+            <a:off x="748665" y="2447714"/>
+            <a:ext cx="9464040" cy="800100"/>
           </a:xfrm>
         </p:spPr>
         <p:txBody>
@@ -894,7 +874,7 @@
           <a:lstStyle>
             <a:lvl1pPr marL="0" indent="0">
               <a:buNone/>
-              <a:defRPr sz="2400">
+              <a:defRPr sz="1280">
                 <a:solidFill>
                   <a:schemeClr val="tx1">
                     <a:tint val="75000"/>
@@ -902,9 +882,9 @@
                 </a:solidFill>
               </a:defRPr>
             </a:lvl1pPr>
-            <a:lvl2pPr marL="457200" indent="0">
-              <a:buNone/>
-              <a:defRPr sz="2000">
+            <a:lvl2pPr marL="243825" indent="0">
+              <a:buNone/>
+              <a:defRPr sz="1067">
                 <a:solidFill>
                   <a:schemeClr val="tx1">
                     <a:tint val="75000"/>
@@ -912,9 +892,9 @@
                 </a:solidFill>
               </a:defRPr>
             </a:lvl2pPr>
-            <a:lvl3pPr marL="914400" indent="0">
-              <a:buNone/>
-              <a:defRPr sz="1800">
+            <a:lvl3pPr marL="487650" indent="0">
+              <a:buNone/>
+              <a:defRPr sz="960">
                 <a:solidFill>
                   <a:schemeClr val="tx1">
                     <a:tint val="75000"/>
@@ -922,9 +902,9 @@
                 </a:solidFill>
               </a:defRPr>
             </a:lvl3pPr>
-            <a:lvl4pPr marL="1371600" indent="0">
-              <a:buNone/>
-              <a:defRPr sz="1600">
+            <a:lvl4pPr marL="731474" indent="0">
+              <a:buNone/>
+              <a:defRPr sz="853">
                 <a:solidFill>
                   <a:schemeClr val="tx1">
                     <a:tint val="75000"/>
@@ -932,9 +912,9 @@
                 </a:solidFill>
               </a:defRPr>
             </a:lvl4pPr>
-            <a:lvl5pPr marL="1828800" indent="0">
-              <a:buNone/>
-              <a:defRPr sz="1600">
+            <a:lvl5pPr marL="975299" indent="0">
+              <a:buNone/>
+              <a:defRPr sz="853">
                 <a:solidFill>
                   <a:schemeClr val="tx1">
                     <a:tint val="75000"/>
@@ -942,9 +922,9 @@
                 </a:solidFill>
               </a:defRPr>
             </a:lvl5pPr>
-            <a:lvl6pPr marL="2286000" indent="0">
-              <a:buNone/>
-              <a:defRPr sz="1600">
+            <a:lvl6pPr marL="1219124" indent="0">
+              <a:buNone/>
+              <a:defRPr sz="853">
                 <a:solidFill>
                   <a:schemeClr val="tx1">
                     <a:tint val="75000"/>
@@ -952,9 +932,9 @@
                 </a:solidFill>
               </a:defRPr>
             </a:lvl6pPr>
-            <a:lvl7pPr marL="2743200" indent="0">
-              <a:buNone/>
-              <a:defRPr sz="1600">
+            <a:lvl7pPr marL="1462949" indent="0">
+              <a:buNone/>
+              <a:defRPr sz="853">
                 <a:solidFill>
                   <a:schemeClr val="tx1">
                     <a:tint val="75000"/>
@@ -962,9 +942,9 @@
                 </a:solidFill>
               </a:defRPr>
             </a:lvl7pPr>
-            <a:lvl8pPr marL="3200400" indent="0">
-              <a:buNone/>
-              <a:defRPr sz="1600">
+            <a:lvl8pPr marL="1706773" indent="0">
+              <a:buNone/>
+              <a:defRPr sz="853">
                 <a:solidFill>
                   <a:schemeClr val="tx1">
                     <a:tint val="75000"/>
@@ -972,9 +952,9 @@
                 </a:solidFill>
               </a:defRPr>
             </a:lvl8pPr>
-            <a:lvl9pPr marL="3657600" indent="0">
-              <a:buNone/>
-              <a:defRPr sz="1600">
+            <a:lvl9pPr marL="1950598" indent="0">
+              <a:buNone/>
+              <a:defRPr sz="853">
                 <a:solidFill>
                   <a:schemeClr val="tx1">
                     <a:tint val="75000"/>
@@ -1009,7 +989,7 @@
           <a:p>
             <a:fld id="{648A3E35-6C1F-AA47-866B-1252AC193DCC}" type="datetimeFigureOut">
               <a:rPr lang="en-US" smtClean="0"/>
-              <a:t>5/6/21</a:t>
+              <a:t>5/10/21</a:t>
             </a:fld>
             <a:endParaRPr lang="en-US"/>
           </a:p>
@@ -1058,11 +1038,6 @@
         </p:txBody>
       </p:sp>
     </p:spTree>
-    <p:extLst>
-      <p:ext uri="{BB962C8B-B14F-4D97-AF65-F5344CB8AC3E}">
-        <p14:creationId xmlns:p14="http://schemas.microsoft.com/office/powerpoint/2010/main" val="1632508933"/>
-      </p:ext>
-    </p:extLst>
   </p:cSld>
   <p:clrMapOvr>
     <a:masterClrMapping/>
@@ -1106,7 +1081,7 @@
               <a:rPr lang="en-US" smtClean="0"/>
               <a:t>Click to edit Master title style</a:t>
             </a:r>
-            <a:endParaRPr lang="en-US"/>
+            <a:endParaRPr lang="en-US" dirty="0"/>
           </a:p>
         </p:txBody>
       </p:sp>
@@ -1122,8 +1097,8 @@
         </p:nvSpPr>
         <p:spPr>
           <a:xfrm>
-            <a:off x="838200" y="1825625"/>
-            <a:ext cx="5181600" cy="4351338"/>
+            <a:off x="754380" y="973666"/>
+            <a:ext cx="4663440" cy="2320714"/>
           </a:xfrm>
         </p:spPr>
         <p:txBody>
@@ -1163,7 +1138,7 @@
               <a:rPr lang="en-US" smtClean="0"/>
               <a:t>Fifth level</a:t>
             </a:r>
-            <a:endParaRPr lang="en-US"/>
+            <a:endParaRPr lang="en-US" dirty="0"/>
           </a:p>
         </p:txBody>
       </p:sp>
@@ -1179,8 +1154,8 @@
         </p:nvSpPr>
         <p:spPr>
           <a:xfrm>
-            <a:off x="6172200" y="1825625"/>
-            <a:ext cx="5181600" cy="4351338"/>
+            <a:off x="5554980" y="973666"/>
+            <a:ext cx="4663440" cy="2320714"/>
           </a:xfrm>
         </p:spPr>
         <p:txBody>
@@ -1220,7 +1195,7 @@
               <a:rPr lang="en-US" smtClean="0"/>
               <a:t>Fifth level</a:t>
             </a:r>
-            <a:endParaRPr lang="en-US"/>
+            <a:endParaRPr lang="en-US" dirty="0"/>
           </a:p>
         </p:txBody>
       </p:sp>
@@ -1241,7 +1216,7 @@
           <a:p>
             <a:fld id="{648A3E35-6C1F-AA47-866B-1252AC193DCC}" type="datetimeFigureOut">
               <a:rPr lang="en-US" smtClean="0"/>
-              <a:t>5/6/21</a:t>
+              <a:t>5/10/21</a:t>
             </a:fld>
             <a:endParaRPr lang="en-US"/>
           </a:p>
@@ -1290,11 +1265,6 @@
         </p:txBody>
       </p:sp>
     </p:spTree>
-    <p:extLst>
-      <p:ext uri="{BB962C8B-B14F-4D97-AF65-F5344CB8AC3E}">
-        <p14:creationId xmlns:p14="http://schemas.microsoft.com/office/powerpoint/2010/main" val="1326562859"/>
-      </p:ext>
-    </p:extLst>
   </p:cSld>
   <p:clrMapOvr>
     <a:masterClrMapping/>
@@ -1331,8 +1301,8 @@
         </p:nvSpPr>
         <p:spPr>
           <a:xfrm>
-            <a:off x="839788" y="365125"/>
-            <a:ext cx="10515600" cy="1325563"/>
+            <a:off x="755809" y="194734"/>
+            <a:ext cx="9464040" cy="706967"/>
           </a:xfrm>
         </p:spPr>
         <p:txBody>
@@ -1343,7 +1313,7 @@
               <a:rPr lang="en-US" smtClean="0"/>
               <a:t>Click to edit Master title style</a:t>
             </a:r>
-            <a:endParaRPr lang="en-US"/>
+            <a:endParaRPr lang="en-US" dirty="0"/>
           </a:p>
         </p:txBody>
       </p:sp>
@@ -1359,8 +1329,8 @@
         </p:nvSpPr>
         <p:spPr>
           <a:xfrm>
-            <a:off x="839788" y="1681163"/>
-            <a:ext cx="5157787" cy="823912"/>
+            <a:off x="755810" y="896620"/>
+            <a:ext cx="4642008" cy="439420"/>
           </a:xfrm>
         </p:spPr>
         <p:txBody>
@@ -1368,39 +1338,39 @@
           <a:lstStyle>
             <a:lvl1pPr marL="0" indent="0">
               <a:buNone/>
-              <a:defRPr sz="2400" b="1"/>
+              <a:defRPr sz="1280" b="1"/>
             </a:lvl1pPr>
-            <a:lvl2pPr marL="457200" indent="0">
-              <a:buNone/>
-              <a:defRPr sz="2000" b="1"/>
+            <a:lvl2pPr marL="243825" indent="0">
+              <a:buNone/>
+              <a:defRPr sz="1067" b="1"/>
             </a:lvl2pPr>
-            <a:lvl3pPr marL="914400" indent="0">
-              <a:buNone/>
-              <a:defRPr sz="1800" b="1"/>
+            <a:lvl3pPr marL="487650" indent="0">
+              <a:buNone/>
+              <a:defRPr sz="960" b="1"/>
             </a:lvl3pPr>
-            <a:lvl4pPr marL="1371600" indent="0">
-              <a:buNone/>
-              <a:defRPr sz="1600" b="1"/>
+            <a:lvl4pPr marL="731474" indent="0">
+              <a:buNone/>
+              <a:defRPr sz="853" b="1"/>
             </a:lvl4pPr>
-            <a:lvl5pPr marL="1828800" indent="0">
-              <a:buNone/>
-              <a:defRPr sz="1600" b="1"/>
+            <a:lvl5pPr marL="975299" indent="0">
+              <a:buNone/>
+              <a:defRPr sz="853" b="1"/>
             </a:lvl5pPr>
-            <a:lvl6pPr marL="2286000" indent="0">
-              <a:buNone/>
-              <a:defRPr sz="1600" b="1"/>
+            <a:lvl6pPr marL="1219124" indent="0">
+              <a:buNone/>
+              <a:defRPr sz="853" b="1"/>
             </a:lvl6pPr>
-            <a:lvl7pPr marL="2743200" indent="0">
-              <a:buNone/>
-              <a:defRPr sz="1600" b="1"/>
+            <a:lvl7pPr marL="1462949" indent="0">
+              <a:buNone/>
+              <a:defRPr sz="853" b="1"/>
             </a:lvl7pPr>
-            <a:lvl8pPr marL="3200400" indent="0">
-              <a:buNone/>
-              <a:defRPr sz="1600" b="1"/>
+            <a:lvl8pPr marL="1706773" indent="0">
+              <a:buNone/>
+              <a:defRPr sz="853" b="1"/>
             </a:lvl8pPr>
-            <a:lvl9pPr marL="3657600" indent="0">
-              <a:buNone/>
-              <a:defRPr sz="1600" b="1"/>
+            <a:lvl9pPr marL="1950598" indent="0">
+              <a:buNone/>
+              <a:defRPr sz="853" b="1"/>
             </a:lvl9pPr>
           </a:lstStyle>
           <a:p>
@@ -1424,8 +1394,8 @@
         </p:nvSpPr>
         <p:spPr>
           <a:xfrm>
-            <a:off x="839788" y="2505075"/>
-            <a:ext cx="5157787" cy="3684588"/>
+            <a:off x="755810" y="1336040"/>
+            <a:ext cx="4642008" cy="1965114"/>
           </a:xfrm>
         </p:spPr>
         <p:txBody>
@@ -1465,7 +1435,7 @@
               <a:rPr lang="en-US" smtClean="0"/>
               <a:t>Fifth level</a:t>
             </a:r>
-            <a:endParaRPr lang="en-US"/>
+            <a:endParaRPr lang="en-US" dirty="0"/>
           </a:p>
         </p:txBody>
       </p:sp>
@@ -1481,8 +1451,8 @@
         </p:nvSpPr>
         <p:spPr>
           <a:xfrm>
-            <a:off x="6172200" y="1681163"/>
-            <a:ext cx="5183188" cy="823912"/>
+            <a:off x="5554980" y="896620"/>
+            <a:ext cx="4664869" cy="439420"/>
           </a:xfrm>
         </p:spPr>
         <p:txBody>
@@ -1490,39 +1460,39 @@
           <a:lstStyle>
             <a:lvl1pPr marL="0" indent="0">
               <a:buNone/>
-              <a:defRPr sz="2400" b="1"/>
+              <a:defRPr sz="1280" b="1"/>
             </a:lvl1pPr>
-            <a:lvl2pPr marL="457200" indent="0">
-              <a:buNone/>
-              <a:defRPr sz="2000" b="1"/>
+            <a:lvl2pPr marL="243825" indent="0">
+              <a:buNone/>
+              <a:defRPr sz="1067" b="1"/>
             </a:lvl2pPr>
-            <a:lvl3pPr marL="914400" indent="0">
-              <a:buNone/>
-              <a:defRPr sz="1800" b="1"/>
+            <a:lvl3pPr marL="487650" indent="0">
+              <a:buNone/>
+              <a:defRPr sz="960" b="1"/>
             </a:lvl3pPr>
-            <a:lvl4pPr marL="1371600" indent="0">
-              <a:buNone/>
-              <a:defRPr sz="1600" b="1"/>
+            <a:lvl4pPr marL="731474" indent="0">
+              <a:buNone/>
+              <a:defRPr sz="853" b="1"/>
             </a:lvl4pPr>
-            <a:lvl5pPr marL="1828800" indent="0">
-              <a:buNone/>
-              <a:defRPr sz="1600" b="1"/>
+            <a:lvl5pPr marL="975299" indent="0">
+              <a:buNone/>
+              <a:defRPr sz="853" b="1"/>
             </a:lvl5pPr>
-            <a:lvl6pPr marL="2286000" indent="0">
-              <a:buNone/>
-              <a:defRPr sz="1600" b="1"/>
+            <a:lvl6pPr marL="1219124" indent="0">
+              <a:buNone/>
+              <a:defRPr sz="853" b="1"/>
             </a:lvl6pPr>
-            <a:lvl7pPr marL="2743200" indent="0">
-              <a:buNone/>
-              <a:defRPr sz="1600" b="1"/>
+            <a:lvl7pPr marL="1462949" indent="0">
+              <a:buNone/>
+              <a:defRPr sz="853" b="1"/>
             </a:lvl7pPr>
-            <a:lvl8pPr marL="3200400" indent="0">
-              <a:buNone/>
-              <a:defRPr sz="1600" b="1"/>
+            <a:lvl8pPr marL="1706773" indent="0">
+              <a:buNone/>
+              <a:defRPr sz="853" b="1"/>
             </a:lvl8pPr>
-            <a:lvl9pPr marL="3657600" indent="0">
-              <a:buNone/>
-              <a:defRPr sz="1600" b="1"/>
+            <a:lvl9pPr marL="1950598" indent="0">
+              <a:buNone/>
+              <a:defRPr sz="853" b="1"/>
             </a:lvl9pPr>
           </a:lstStyle>
           <a:p>
@@ -1546,8 +1516,8 @@
         </p:nvSpPr>
         <p:spPr>
           <a:xfrm>
-            <a:off x="6172200" y="2505075"/>
-            <a:ext cx="5183188" cy="3684588"/>
+            <a:off x="5554980" y="1336040"/>
+            <a:ext cx="4664869" cy="1965114"/>
           </a:xfrm>
         </p:spPr>
         <p:txBody>
@@ -1587,7 +1557,7 @@
               <a:rPr lang="en-US" smtClean="0"/>
               <a:t>Fifth level</a:t>
             </a:r>
-            <a:endParaRPr lang="en-US"/>
+            <a:endParaRPr lang="en-US" dirty="0"/>
           </a:p>
         </p:txBody>
       </p:sp>
@@ -1608,7 +1578,7 @@
           <a:p>
             <a:fld id="{648A3E35-6C1F-AA47-866B-1252AC193DCC}" type="datetimeFigureOut">
               <a:rPr lang="en-US" smtClean="0"/>
-              <a:t>5/6/21</a:t>
+              <a:t>5/10/21</a:t>
             </a:fld>
             <a:endParaRPr lang="en-US"/>
           </a:p>
@@ -1657,11 +1627,6 @@
         </p:txBody>
       </p:sp>
     </p:spTree>
-    <p:extLst>
-      <p:ext uri="{BB962C8B-B14F-4D97-AF65-F5344CB8AC3E}">
-        <p14:creationId xmlns:p14="http://schemas.microsoft.com/office/powerpoint/2010/main" val="366748059"/>
-      </p:ext>
-    </p:extLst>
   </p:cSld>
   <p:clrMapOvr>
     <a:masterClrMapping/>
@@ -1705,7 +1670,7 @@
               <a:rPr lang="en-US" smtClean="0"/>
               <a:t>Click to edit Master title style</a:t>
             </a:r>
-            <a:endParaRPr lang="en-US"/>
+            <a:endParaRPr lang="en-US" dirty="0"/>
           </a:p>
         </p:txBody>
       </p:sp>
@@ -1726,7 +1691,7 @@
           <a:p>
             <a:fld id="{648A3E35-6C1F-AA47-866B-1252AC193DCC}" type="datetimeFigureOut">
               <a:rPr lang="en-US" smtClean="0"/>
-              <a:t>5/6/21</a:t>
+              <a:t>5/10/21</a:t>
             </a:fld>
             <a:endParaRPr lang="en-US"/>
           </a:p>
@@ -1775,11 +1740,6 @@
         </p:txBody>
       </p:sp>
     </p:spTree>
-    <p:extLst>
-      <p:ext uri="{BB962C8B-B14F-4D97-AF65-F5344CB8AC3E}">
-        <p14:creationId xmlns:p14="http://schemas.microsoft.com/office/powerpoint/2010/main" val="656560723"/>
-      </p:ext>
-    </p:extLst>
   </p:cSld>
   <p:clrMapOvr>
     <a:masterClrMapping/>
@@ -1821,7 +1781,7 @@
           <a:p>
             <a:fld id="{648A3E35-6C1F-AA47-866B-1252AC193DCC}" type="datetimeFigureOut">
               <a:rPr lang="en-US" smtClean="0"/>
-              <a:t>5/6/21</a:t>
+              <a:t>5/10/21</a:t>
             </a:fld>
             <a:endParaRPr lang="en-US"/>
           </a:p>
@@ -1870,11 +1830,6 @@
         </p:txBody>
       </p:sp>
     </p:spTree>
-    <p:extLst>
-      <p:ext uri="{BB962C8B-B14F-4D97-AF65-F5344CB8AC3E}">
-        <p14:creationId xmlns:p14="http://schemas.microsoft.com/office/powerpoint/2010/main" val="1045093175"/>
-      </p:ext>
-    </p:extLst>
   </p:cSld>
   <p:clrMapOvr>
     <a:masterClrMapping/>
@@ -1911,15 +1866,15 @@
         </p:nvSpPr>
         <p:spPr>
           <a:xfrm>
-            <a:off x="839788" y="457200"/>
-            <a:ext cx="3932237" cy="1600200"/>
+            <a:off x="755810" y="243840"/>
+            <a:ext cx="3539013" cy="853440"/>
           </a:xfrm>
         </p:spPr>
         <p:txBody>
           <a:bodyPr anchor="b"/>
           <a:lstStyle>
             <a:lvl1pPr>
-              <a:defRPr sz="3200"/>
+              <a:defRPr sz="1707"/>
             </a:lvl1pPr>
           </a:lstStyle>
           <a:p>
@@ -1927,7 +1882,7 @@
               <a:rPr lang="en-US" smtClean="0"/>
               <a:t>Click to edit Master title style</a:t>
             </a:r>
-            <a:endParaRPr lang="en-US"/>
+            <a:endParaRPr lang="en-US" dirty="0"/>
           </a:p>
         </p:txBody>
       </p:sp>
@@ -1943,39 +1898,39 @@
         </p:nvSpPr>
         <p:spPr>
           <a:xfrm>
-            <a:off x="5183188" y="987425"/>
-            <a:ext cx="6172200" cy="4873625"/>
+            <a:off x="4664869" y="526627"/>
+            <a:ext cx="5554980" cy="2599267"/>
           </a:xfrm>
         </p:spPr>
         <p:txBody>
           <a:bodyPr/>
           <a:lstStyle>
             <a:lvl1pPr>
-              <a:defRPr sz="3200"/>
+              <a:defRPr sz="1707"/>
             </a:lvl1pPr>
             <a:lvl2pPr>
-              <a:defRPr sz="2800"/>
+              <a:defRPr sz="1493"/>
             </a:lvl2pPr>
             <a:lvl3pPr>
-              <a:defRPr sz="2400"/>
+              <a:defRPr sz="1280"/>
             </a:lvl3pPr>
             <a:lvl4pPr>
-              <a:defRPr sz="2000"/>
+              <a:defRPr sz="1067"/>
             </a:lvl4pPr>
             <a:lvl5pPr>
-              <a:defRPr sz="2000"/>
+              <a:defRPr sz="1067"/>
             </a:lvl5pPr>
             <a:lvl6pPr>
-              <a:defRPr sz="2000"/>
+              <a:defRPr sz="1067"/>
             </a:lvl6pPr>
             <a:lvl7pPr>
-              <a:defRPr sz="2000"/>
+              <a:defRPr sz="1067"/>
             </a:lvl7pPr>
             <a:lvl8pPr>
-              <a:defRPr sz="2000"/>
+              <a:defRPr sz="1067"/>
             </a:lvl8pPr>
             <a:lvl9pPr>
-              <a:defRPr sz="2000"/>
+              <a:defRPr sz="1067"/>
             </a:lvl9pPr>
           </a:lstStyle>
           <a:p>
@@ -2012,7 +1967,7 @@
               <a:rPr lang="en-US" smtClean="0"/>
               <a:t>Fifth level</a:t>
             </a:r>
-            <a:endParaRPr lang="en-US"/>
+            <a:endParaRPr lang="en-US" dirty="0"/>
           </a:p>
         </p:txBody>
       </p:sp>
@@ -2028,8 +1983,8 @@
         </p:nvSpPr>
         <p:spPr>
           <a:xfrm>
-            <a:off x="839788" y="2057400"/>
-            <a:ext cx="3932237" cy="3811588"/>
+            <a:off x="755810" y="1097280"/>
+            <a:ext cx="3539013" cy="2032847"/>
           </a:xfrm>
         </p:spPr>
         <p:txBody>
@@ -2037,39 +1992,39 @@
           <a:lstStyle>
             <a:lvl1pPr marL="0" indent="0">
               <a:buNone/>
-              <a:defRPr sz="1600"/>
+              <a:defRPr sz="853"/>
             </a:lvl1pPr>
-            <a:lvl2pPr marL="457200" indent="0">
-              <a:buNone/>
-              <a:defRPr sz="1400"/>
+            <a:lvl2pPr marL="243825" indent="0">
+              <a:buNone/>
+              <a:defRPr sz="747"/>
             </a:lvl2pPr>
-            <a:lvl3pPr marL="914400" indent="0">
-              <a:buNone/>
-              <a:defRPr sz="1200"/>
+            <a:lvl3pPr marL="487650" indent="0">
+              <a:buNone/>
+              <a:defRPr sz="640"/>
             </a:lvl3pPr>
-            <a:lvl4pPr marL="1371600" indent="0">
-              <a:buNone/>
-              <a:defRPr sz="1000"/>
+            <a:lvl4pPr marL="731474" indent="0">
+              <a:buNone/>
+              <a:defRPr sz="533"/>
             </a:lvl4pPr>
-            <a:lvl5pPr marL="1828800" indent="0">
-              <a:buNone/>
-              <a:defRPr sz="1000"/>
+            <a:lvl5pPr marL="975299" indent="0">
+              <a:buNone/>
+              <a:defRPr sz="533"/>
             </a:lvl5pPr>
-            <a:lvl6pPr marL="2286000" indent="0">
-              <a:buNone/>
-              <a:defRPr sz="1000"/>
+            <a:lvl6pPr marL="1219124" indent="0">
+              <a:buNone/>
+              <a:defRPr sz="533"/>
             </a:lvl6pPr>
-            <a:lvl7pPr marL="2743200" indent="0">
-              <a:buNone/>
-              <a:defRPr sz="1000"/>
+            <a:lvl7pPr marL="1462949" indent="0">
+              <a:buNone/>
+              <a:defRPr sz="533"/>
             </a:lvl7pPr>
-            <a:lvl8pPr marL="3200400" indent="0">
-              <a:buNone/>
-              <a:defRPr sz="1000"/>
+            <a:lvl8pPr marL="1706773" indent="0">
+              <a:buNone/>
+              <a:defRPr sz="533"/>
             </a:lvl8pPr>
-            <a:lvl9pPr marL="3657600" indent="0">
-              <a:buNone/>
-              <a:defRPr sz="1000"/>
+            <a:lvl9pPr marL="1950598" indent="0">
+              <a:buNone/>
+              <a:defRPr sz="533"/>
             </a:lvl9pPr>
           </a:lstStyle>
           <a:p>
@@ -2098,7 +2053,7 @@
           <a:p>
             <a:fld id="{648A3E35-6C1F-AA47-866B-1252AC193DCC}" type="datetimeFigureOut">
               <a:rPr lang="en-US" smtClean="0"/>
-              <a:t>5/6/21</a:t>
+              <a:t>5/10/21</a:t>
             </a:fld>
             <a:endParaRPr lang="en-US"/>
           </a:p>
@@ -2147,11 +2102,6 @@
         </p:txBody>
       </p:sp>
     </p:spTree>
-    <p:extLst>
-      <p:ext uri="{BB962C8B-B14F-4D97-AF65-F5344CB8AC3E}">
-        <p14:creationId xmlns:p14="http://schemas.microsoft.com/office/powerpoint/2010/main" val="612243412"/>
-      </p:ext>
-    </p:extLst>
   </p:cSld>
   <p:clrMapOvr>
     <a:masterClrMapping/>
@@ -2188,15 +2138,15 @@
         </p:nvSpPr>
         <p:spPr>
           <a:xfrm>
-            <a:off x="839788" y="457200"/>
-            <a:ext cx="3932237" cy="1600200"/>
+            <a:off x="755810" y="243840"/>
+            <a:ext cx="3539013" cy="853440"/>
           </a:xfrm>
         </p:spPr>
         <p:txBody>
           <a:bodyPr anchor="b"/>
           <a:lstStyle>
             <a:lvl1pPr>
-              <a:defRPr sz="3200"/>
+              <a:defRPr sz="1707"/>
             </a:lvl1pPr>
           </a:lstStyle>
           <a:p>
@@ -2204,7 +2154,7 @@
               <a:rPr lang="en-US" smtClean="0"/>
               <a:t>Click to edit Master title style</a:t>
             </a:r>
-            <a:endParaRPr lang="en-US"/>
+            <a:endParaRPr lang="en-US" dirty="0"/>
           </a:p>
         </p:txBody>
       </p:sp>
@@ -2212,7 +2162,7 @@
         <p:nvSpPr>
           <p:cNvPr id="3" name="Picture Placeholder 2"/>
           <p:cNvSpPr>
-            <a:spLocks noGrp="1"/>
+            <a:spLocks noGrp="1" noChangeAspect="1"/>
           </p:cNvSpPr>
           <p:nvPr>
             <p:ph type="pic" idx="1"/>
@@ -2220,52 +2170,56 @@
         </p:nvSpPr>
         <p:spPr>
           <a:xfrm>
-            <a:off x="5183188" y="987425"/>
-            <a:ext cx="6172200" cy="4873625"/>
+            <a:off x="4664869" y="526627"/>
+            <a:ext cx="5554980" cy="2599267"/>
           </a:xfrm>
         </p:spPr>
         <p:txBody>
-          <a:bodyPr/>
+          <a:bodyPr anchor="t"/>
           <a:lstStyle>
             <a:lvl1pPr marL="0" indent="0">
               <a:buNone/>
-              <a:defRPr sz="3200"/>
+              <a:defRPr sz="1707"/>
             </a:lvl1pPr>
-            <a:lvl2pPr marL="457200" indent="0">
-              <a:buNone/>
-              <a:defRPr sz="2800"/>
+            <a:lvl2pPr marL="243825" indent="0">
+              <a:buNone/>
+              <a:defRPr sz="1493"/>
             </a:lvl2pPr>
-            <a:lvl3pPr marL="914400" indent="0">
-              <a:buNone/>
-              <a:defRPr sz="2400"/>
+            <a:lvl3pPr marL="487650" indent="0">
+              <a:buNone/>
+              <a:defRPr sz="1280"/>
             </a:lvl3pPr>
-            <a:lvl4pPr marL="1371600" indent="0">
-              <a:buNone/>
-              <a:defRPr sz="2000"/>
+            <a:lvl4pPr marL="731474" indent="0">
+              <a:buNone/>
+              <a:defRPr sz="1067"/>
             </a:lvl4pPr>
-            <a:lvl5pPr marL="1828800" indent="0">
-              <a:buNone/>
-              <a:defRPr sz="2000"/>
+            <a:lvl5pPr marL="975299" indent="0">
+              <a:buNone/>
+              <a:defRPr sz="1067"/>
             </a:lvl5pPr>
-            <a:lvl6pPr marL="2286000" indent="0">
-              <a:buNone/>
-              <a:defRPr sz="2000"/>
+            <a:lvl6pPr marL="1219124" indent="0">
+              <a:buNone/>
+              <a:defRPr sz="1067"/>
             </a:lvl6pPr>
-            <a:lvl7pPr marL="2743200" indent="0">
-              <a:buNone/>
-              <a:defRPr sz="2000"/>
+            <a:lvl7pPr marL="1462949" indent="0">
+              <a:buNone/>
+              <a:defRPr sz="1067"/>
             </a:lvl7pPr>
-            <a:lvl8pPr marL="3200400" indent="0">
-              <a:buNone/>
-              <a:defRPr sz="2000"/>
+            <a:lvl8pPr marL="1706773" indent="0">
+              <a:buNone/>
+              <a:defRPr sz="1067"/>
             </a:lvl8pPr>
-            <a:lvl9pPr marL="3657600" indent="0">
-              <a:buNone/>
-              <a:defRPr sz="2000"/>
+            <a:lvl9pPr marL="1950598" indent="0">
+              <a:buNone/>
+              <a:defRPr sz="1067"/>
             </a:lvl9pPr>
           </a:lstStyle>
           <a:p>
-            <a:endParaRPr lang="en-US"/>
+            <a:r>
+              <a:rPr lang="en-US" smtClean="0"/>
+              <a:t>Drag picture to placeholder or click icon to add</a:t>
+            </a:r>
+            <a:endParaRPr lang="en-US" dirty="0"/>
           </a:p>
         </p:txBody>
       </p:sp>
@@ -2281,8 +2235,8 @@
         </p:nvSpPr>
         <p:spPr>
           <a:xfrm>
-            <a:off x="839788" y="2057400"/>
-            <a:ext cx="3932237" cy="3811588"/>
+            <a:off x="755810" y="1097280"/>
+            <a:ext cx="3539013" cy="2032847"/>
           </a:xfrm>
         </p:spPr>
         <p:txBody>
@@ -2290,39 +2244,39 @@
           <a:lstStyle>
             <a:lvl1pPr marL="0" indent="0">
               <a:buNone/>
-              <a:defRPr sz="1600"/>
+              <a:defRPr sz="853"/>
             </a:lvl1pPr>
-            <a:lvl2pPr marL="457200" indent="0">
-              <a:buNone/>
-              <a:defRPr sz="1400"/>
+            <a:lvl2pPr marL="243825" indent="0">
+              <a:buNone/>
+              <a:defRPr sz="747"/>
             </a:lvl2pPr>
-            <a:lvl3pPr marL="914400" indent="0">
-              <a:buNone/>
-              <a:defRPr sz="1200"/>
+            <a:lvl3pPr marL="487650" indent="0">
+              <a:buNone/>
+              <a:defRPr sz="640"/>
             </a:lvl3pPr>
-            <a:lvl4pPr marL="1371600" indent="0">
-              <a:buNone/>
-              <a:defRPr sz="1000"/>
+            <a:lvl4pPr marL="731474" indent="0">
+              <a:buNone/>
+              <a:defRPr sz="533"/>
             </a:lvl4pPr>
-            <a:lvl5pPr marL="1828800" indent="0">
-              <a:buNone/>
-              <a:defRPr sz="1000"/>
+            <a:lvl5pPr marL="975299" indent="0">
+              <a:buNone/>
+              <a:defRPr sz="533"/>
             </a:lvl5pPr>
-            <a:lvl6pPr marL="2286000" indent="0">
-              <a:buNone/>
-              <a:defRPr sz="1000"/>
+            <a:lvl6pPr marL="1219124" indent="0">
+              <a:buNone/>
+              <a:defRPr sz="533"/>
             </a:lvl6pPr>
-            <a:lvl7pPr marL="2743200" indent="0">
-              <a:buNone/>
-              <a:defRPr sz="1000"/>
+            <a:lvl7pPr marL="1462949" indent="0">
+              <a:buNone/>
+              <a:defRPr sz="533"/>
             </a:lvl7pPr>
-            <a:lvl8pPr marL="3200400" indent="0">
-              <a:buNone/>
-              <a:defRPr sz="1000"/>
+            <a:lvl8pPr marL="1706773" indent="0">
+              <a:buNone/>
+              <a:defRPr sz="533"/>
             </a:lvl8pPr>
-            <a:lvl9pPr marL="3657600" indent="0">
-              <a:buNone/>
-              <a:defRPr sz="1000"/>
+            <a:lvl9pPr marL="1950598" indent="0">
+              <a:buNone/>
+              <a:defRPr sz="533"/>
             </a:lvl9pPr>
           </a:lstStyle>
           <a:p>
@@ -2351,7 +2305,7 @@
           <a:p>
             <a:fld id="{648A3E35-6C1F-AA47-866B-1252AC193DCC}" type="datetimeFigureOut">
               <a:rPr lang="en-US" smtClean="0"/>
-              <a:t>5/6/21</a:t>
+              <a:t>5/10/21</a:t>
             </a:fld>
             <a:endParaRPr lang="en-US"/>
           </a:p>
@@ -2400,11 +2354,6 @@
         </p:txBody>
       </p:sp>
     </p:spTree>
-    <p:extLst>
-      <p:ext uri="{BB962C8B-B14F-4D97-AF65-F5344CB8AC3E}">
-        <p14:creationId xmlns:p14="http://schemas.microsoft.com/office/powerpoint/2010/main" val="1380872707"/>
-      </p:ext>
-    </p:extLst>
   </p:cSld>
   <p:clrMapOvr>
     <a:masterClrMapping/>
@@ -2446,8 +2395,8 @@
         </p:nvSpPr>
         <p:spPr>
           <a:xfrm>
-            <a:off x="838200" y="365125"/>
-            <a:ext cx="10515600" cy="1325563"/>
+            <a:off x="754380" y="194734"/>
+            <a:ext cx="9464040" cy="706967"/>
           </a:xfrm>
           <a:prstGeom prst="rect">
             <a:avLst/>
@@ -2463,7 +2412,7 @@
               <a:rPr lang="en-US" smtClean="0"/>
               <a:t>Click to edit Master title style</a:t>
             </a:r>
-            <a:endParaRPr lang="en-US"/>
+            <a:endParaRPr lang="en-US" dirty="0"/>
           </a:p>
         </p:txBody>
       </p:sp>
@@ -2479,8 +2428,8 @@
         </p:nvSpPr>
         <p:spPr>
           <a:xfrm>
-            <a:off x="838200" y="1825625"/>
-            <a:ext cx="10515600" cy="4351338"/>
+            <a:off x="754380" y="973666"/>
+            <a:ext cx="9464040" cy="2320714"/>
           </a:xfrm>
           <a:prstGeom prst="rect">
             <a:avLst/>
@@ -2525,7 +2474,7 @@
               <a:rPr lang="en-US" smtClean="0"/>
               <a:t>Fifth level</a:t>
             </a:r>
-            <a:endParaRPr lang="en-US"/>
+            <a:endParaRPr lang="en-US" dirty="0"/>
           </a:p>
         </p:txBody>
       </p:sp>
@@ -2541,8 +2490,8 @@
         </p:nvSpPr>
         <p:spPr>
           <a:xfrm>
-            <a:off x="838200" y="6356350"/>
-            <a:ext cx="2743200" cy="365125"/>
+            <a:off x="754380" y="3390054"/>
+            <a:ext cx="2468880" cy="194733"/>
           </a:xfrm>
           <a:prstGeom prst="rect">
             <a:avLst/>
@@ -2552,7 +2501,7 @@
           <a:bodyPr vert="horz" lIns="91440" tIns="45720" rIns="91440" bIns="45720" rtlCol="0" anchor="ctr"/>
           <a:lstStyle>
             <a:lvl1pPr algn="l">
-              <a:defRPr sz="1200">
+              <a:defRPr sz="640">
                 <a:solidFill>
                   <a:schemeClr val="tx1">
                     <a:tint val="75000"/>
@@ -2564,7 +2513,7 @@
           <a:p>
             <a:fld id="{648A3E35-6C1F-AA47-866B-1252AC193DCC}" type="datetimeFigureOut">
               <a:rPr lang="en-US" smtClean="0"/>
-              <a:t>5/6/21</a:t>
+              <a:t>5/10/21</a:t>
             </a:fld>
             <a:endParaRPr lang="en-US"/>
           </a:p>
@@ -2582,8 +2531,8 @@
         </p:nvSpPr>
         <p:spPr>
           <a:xfrm>
-            <a:off x="4038600" y="6356350"/>
-            <a:ext cx="4114800" cy="365125"/>
+            <a:off x="3634740" y="3390054"/>
+            <a:ext cx="3703320" cy="194733"/>
           </a:xfrm>
           <a:prstGeom prst="rect">
             <a:avLst/>
@@ -2593,7 +2542,7 @@
           <a:bodyPr vert="horz" lIns="91440" tIns="45720" rIns="91440" bIns="45720" rtlCol="0" anchor="ctr"/>
           <a:lstStyle>
             <a:lvl1pPr algn="ctr">
-              <a:defRPr sz="1200">
+              <a:defRPr sz="640">
                 <a:solidFill>
                   <a:schemeClr val="tx1">
                     <a:tint val="75000"/>
@@ -2619,8 +2568,8 @@
         </p:nvSpPr>
         <p:spPr>
           <a:xfrm>
-            <a:off x="8610600" y="6356350"/>
-            <a:ext cx="2743200" cy="365125"/>
+            <a:off x="7749540" y="3390054"/>
+            <a:ext cx="2468880" cy="194733"/>
           </a:xfrm>
           <a:prstGeom prst="rect">
             <a:avLst/>
@@ -2630,7 +2579,7 @@
           <a:bodyPr vert="horz" lIns="91440" tIns="45720" rIns="91440" bIns="45720" rtlCol="0" anchor="ctr"/>
           <a:lstStyle>
             <a:lvl1pPr algn="r">
-              <a:defRPr sz="1200">
+              <a:defRPr sz="640">
                 <a:solidFill>
                   <a:schemeClr val="tx1">
                     <a:tint val="75000"/>
@@ -2651,27 +2600,27 @@
     </p:spTree>
     <p:extLst>
       <p:ext uri="{BB962C8B-B14F-4D97-AF65-F5344CB8AC3E}">
-        <p14:creationId xmlns:p14="http://schemas.microsoft.com/office/powerpoint/2010/main" val="1507544565"/>
+        <p14:creationId xmlns:p14="http://schemas.microsoft.com/office/powerpoint/2010/main" val="152821320"/>
       </p:ext>
     </p:extLst>
   </p:cSld>
   <p:clrMap bg1="lt1" tx1="dk1" bg2="lt2" tx2="dk2" accent1="accent1" accent2="accent2" accent3="accent3" accent4="accent4" accent5="accent5" accent6="accent6" hlink="hlink" folHlink="folHlink"/>
   <p:sldLayoutIdLst>
-    <p:sldLayoutId id="2147483649" r:id="rId1"/>
-    <p:sldLayoutId id="2147483650" r:id="rId2"/>
-    <p:sldLayoutId id="2147483651" r:id="rId3"/>
-    <p:sldLayoutId id="2147483652" r:id="rId4"/>
-    <p:sldLayoutId id="2147483653" r:id="rId5"/>
-    <p:sldLayoutId id="2147483654" r:id="rId6"/>
-    <p:sldLayoutId id="2147483655" r:id="rId7"/>
-    <p:sldLayoutId id="2147483656" r:id="rId8"/>
-    <p:sldLayoutId id="2147483657" r:id="rId9"/>
-    <p:sldLayoutId id="2147483658" r:id="rId10"/>
-    <p:sldLayoutId id="2147483659" r:id="rId11"/>
+    <p:sldLayoutId id="2147483673" r:id="rId1"/>
+    <p:sldLayoutId id="2147483674" r:id="rId2"/>
+    <p:sldLayoutId id="2147483675" r:id="rId3"/>
+    <p:sldLayoutId id="2147483676" r:id="rId4"/>
+    <p:sldLayoutId id="2147483677" r:id="rId5"/>
+    <p:sldLayoutId id="2147483678" r:id="rId6"/>
+    <p:sldLayoutId id="2147483679" r:id="rId7"/>
+    <p:sldLayoutId id="2147483680" r:id="rId8"/>
+    <p:sldLayoutId id="2147483681" r:id="rId9"/>
+    <p:sldLayoutId id="2147483682" r:id="rId10"/>
+    <p:sldLayoutId id="2147483683" r:id="rId11"/>
   </p:sldLayoutIdLst>
   <p:txStyles>
     <p:titleStyle>
-      <a:lvl1pPr algn="l" defTabSz="914400" rtl="0" eaLnBrk="1" latinLnBrk="0" hangingPunct="1">
+      <a:lvl1pPr algn="l" defTabSz="487650" rtl="0" eaLnBrk="1" latinLnBrk="0" hangingPunct="1">
         <a:lnSpc>
           <a:spcPct val="90000"/>
         </a:lnSpc>
@@ -2679,7 +2628,7 @@
           <a:spcPct val="0"/>
         </a:spcBef>
         <a:buNone/>
-        <a:defRPr sz="4400" kern="1200">
+        <a:defRPr sz="2347" kern="1200">
           <a:solidFill>
             <a:schemeClr val="tx1"/>
           </a:solidFill>
@@ -2690,16 +2639,16 @@
       </a:lvl1pPr>
     </p:titleStyle>
     <p:bodyStyle>
-      <a:lvl1pPr marL="228600" indent="-228600" algn="l" defTabSz="914400" rtl="0" eaLnBrk="1" latinLnBrk="0" hangingPunct="1">
+      <a:lvl1pPr marL="121912" indent="-121912" algn="l" defTabSz="487650" rtl="0" eaLnBrk="1" latinLnBrk="0" hangingPunct="1">
         <a:lnSpc>
           <a:spcPct val="90000"/>
         </a:lnSpc>
         <a:spcBef>
-          <a:spcPts val="1000"/>
+          <a:spcPts val="533"/>
         </a:spcBef>
-        <a:buFont typeface="Arial"/>
+        <a:buFont typeface="Arial" panose="020B0604020202020204" pitchFamily="34" charset="0"/>
         <a:buChar char="•"/>
-        <a:defRPr sz="2800" kern="1200">
+        <a:defRPr sz="1493" kern="1200">
           <a:solidFill>
             <a:schemeClr val="tx1"/>
           </a:solidFill>
@@ -2708,16 +2657,16 @@
           <a:cs typeface="+mn-cs"/>
         </a:defRPr>
       </a:lvl1pPr>
-      <a:lvl2pPr marL="685800" indent="-228600" algn="l" defTabSz="914400" rtl="0" eaLnBrk="1" latinLnBrk="0" hangingPunct="1">
+      <a:lvl2pPr marL="365737" indent="-121912" algn="l" defTabSz="487650" rtl="0" eaLnBrk="1" latinLnBrk="0" hangingPunct="1">
         <a:lnSpc>
           <a:spcPct val="90000"/>
         </a:lnSpc>
         <a:spcBef>
-          <a:spcPts val="500"/>
+          <a:spcPts val="267"/>
         </a:spcBef>
-        <a:buFont typeface="Arial"/>
+        <a:buFont typeface="Arial" panose="020B0604020202020204" pitchFamily="34" charset="0"/>
         <a:buChar char="•"/>
-        <a:defRPr sz="2400" kern="1200">
+        <a:defRPr sz="1280" kern="1200">
           <a:solidFill>
             <a:schemeClr val="tx1"/>
           </a:solidFill>
@@ -2726,16 +2675,16 @@
           <a:cs typeface="+mn-cs"/>
         </a:defRPr>
       </a:lvl2pPr>
-      <a:lvl3pPr marL="1143000" indent="-228600" algn="l" defTabSz="914400" rtl="0" eaLnBrk="1" latinLnBrk="0" hangingPunct="1">
+      <a:lvl3pPr marL="609562" indent="-121912" algn="l" defTabSz="487650" rtl="0" eaLnBrk="1" latinLnBrk="0" hangingPunct="1">
         <a:lnSpc>
           <a:spcPct val="90000"/>
         </a:lnSpc>
         <a:spcBef>
-          <a:spcPts val="500"/>
+          <a:spcPts val="267"/>
         </a:spcBef>
-        <a:buFont typeface="Arial"/>
+        <a:buFont typeface="Arial" panose="020B0604020202020204" pitchFamily="34" charset="0"/>
         <a:buChar char="•"/>
-        <a:defRPr sz="2000" kern="1200">
+        <a:defRPr sz="1067" kern="1200">
           <a:solidFill>
             <a:schemeClr val="tx1"/>
           </a:solidFill>
@@ -2744,16 +2693,16 @@
           <a:cs typeface="+mn-cs"/>
         </a:defRPr>
       </a:lvl3pPr>
-      <a:lvl4pPr marL="1600200" indent="-228600" algn="l" defTabSz="914400" rtl="0" eaLnBrk="1" latinLnBrk="0" hangingPunct="1">
+      <a:lvl4pPr marL="853387" indent="-121912" algn="l" defTabSz="487650" rtl="0" eaLnBrk="1" latinLnBrk="0" hangingPunct="1">
         <a:lnSpc>
           <a:spcPct val="90000"/>
         </a:lnSpc>
         <a:spcBef>
-          <a:spcPts val="500"/>
+          <a:spcPts val="267"/>
         </a:spcBef>
-        <a:buFont typeface="Arial"/>
+        <a:buFont typeface="Arial" panose="020B0604020202020204" pitchFamily="34" charset="0"/>
         <a:buChar char="•"/>
-        <a:defRPr sz="1800" kern="1200">
+        <a:defRPr sz="960" kern="1200">
           <a:solidFill>
             <a:schemeClr val="tx1"/>
           </a:solidFill>
@@ -2762,16 +2711,16 @@
           <a:cs typeface="+mn-cs"/>
         </a:defRPr>
       </a:lvl4pPr>
-      <a:lvl5pPr marL="2057400" indent="-228600" algn="l" defTabSz="914400" rtl="0" eaLnBrk="1" latinLnBrk="0" hangingPunct="1">
+      <a:lvl5pPr marL="1097211" indent="-121912" algn="l" defTabSz="487650" rtl="0" eaLnBrk="1" latinLnBrk="0" hangingPunct="1">
         <a:lnSpc>
           <a:spcPct val="90000"/>
         </a:lnSpc>
         <a:spcBef>
-          <a:spcPts val="500"/>
+          <a:spcPts val="267"/>
         </a:spcBef>
-        <a:buFont typeface="Arial"/>
+        <a:buFont typeface="Arial" panose="020B0604020202020204" pitchFamily="34" charset="0"/>
         <a:buChar char="•"/>
-        <a:defRPr sz="1800" kern="1200">
+        <a:defRPr sz="960" kern="1200">
           <a:solidFill>
             <a:schemeClr val="tx1"/>
           </a:solidFill>
@@ -2780,16 +2729,16 @@
           <a:cs typeface="+mn-cs"/>
         </a:defRPr>
       </a:lvl5pPr>
-      <a:lvl6pPr marL="2514600" indent="-228600" algn="l" defTabSz="914400" rtl="0" eaLnBrk="1" latinLnBrk="0" hangingPunct="1">
+      <a:lvl6pPr marL="1341036" indent="-121912" algn="l" defTabSz="487650" rtl="0" eaLnBrk="1" latinLnBrk="0" hangingPunct="1">
         <a:lnSpc>
           <a:spcPct val="90000"/>
         </a:lnSpc>
         <a:spcBef>
-          <a:spcPts val="500"/>
+          <a:spcPts val="267"/>
         </a:spcBef>
-        <a:buFont typeface="Arial"/>
+        <a:buFont typeface="Arial" panose="020B0604020202020204" pitchFamily="34" charset="0"/>
         <a:buChar char="•"/>
-        <a:defRPr sz="1800" kern="1200">
+        <a:defRPr sz="960" kern="1200">
           <a:solidFill>
             <a:schemeClr val="tx1"/>
           </a:solidFill>
@@ -2798,16 +2747,16 @@
           <a:cs typeface="+mn-cs"/>
         </a:defRPr>
       </a:lvl6pPr>
-      <a:lvl7pPr marL="2971800" indent="-228600" algn="l" defTabSz="914400" rtl="0" eaLnBrk="1" latinLnBrk="0" hangingPunct="1">
+      <a:lvl7pPr marL="1584861" indent="-121912" algn="l" defTabSz="487650" rtl="0" eaLnBrk="1" latinLnBrk="0" hangingPunct="1">
         <a:lnSpc>
           <a:spcPct val="90000"/>
         </a:lnSpc>
         <a:spcBef>
-          <a:spcPts val="500"/>
+          <a:spcPts val="267"/>
         </a:spcBef>
-        <a:buFont typeface="Arial"/>
+        <a:buFont typeface="Arial" panose="020B0604020202020204" pitchFamily="34" charset="0"/>
         <a:buChar char="•"/>
-        <a:defRPr sz="1800" kern="1200">
+        <a:defRPr sz="960" kern="1200">
           <a:solidFill>
             <a:schemeClr val="tx1"/>
           </a:solidFill>
@@ -2816,16 +2765,16 @@
           <a:cs typeface="+mn-cs"/>
         </a:defRPr>
       </a:lvl7pPr>
-      <a:lvl8pPr marL="3429000" indent="-228600" algn="l" defTabSz="914400" rtl="0" eaLnBrk="1" latinLnBrk="0" hangingPunct="1">
+      <a:lvl8pPr marL="1828686" indent="-121912" algn="l" defTabSz="487650" rtl="0" eaLnBrk="1" latinLnBrk="0" hangingPunct="1">
         <a:lnSpc>
           <a:spcPct val="90000"/>
         </a:lnSpc>
         <a:spcBef>
-          <a:spcPts val="500"/>
+          <a:spcPts val="267"/>
         </a:spcBef>
-        <a:buFont typeface="Arial"/>
+        <a:buFont typeface="Arial" panose="020B0604020202020204" pitchFamily="34" charset="0"/>
         <a:buChar char="•"/>
-        <a:defRPr sz="1800" kern="1200">
+        <a:defRPr sz="960" kern="1200">
           <a:solidFill>
             <a:schemeClr val="tx1"/>
           </a:solidFill>
@@ -2834,16 +2783,16 @@
           <a:cs typeface="+mn-cs"/>
         </a:defRPr>
       </a:lvl8pPr>
-      <a:lvl9pPr marL="3886200" indent="-228600" algn="l" defTabSz="914400" rtl="0" eaLnBrk="1" latinLnBrk="0" hangingPunct="1">
+      <a:lvl9pPr marL="2072510" indent="-121912" algn="l" defTabSz="487650" rtl="0" eaLnBrk="1" latinLnBrk="0" hangingPunct="1">
         <a:lnSpc>
           <a:spcPct val="90000"/>
         </a:lnSpc>
         <a:spcBef>
-          <a:spcPts val="500"/>
+          <a:spcPts val="267"/>
         </a:spcBef>
-        <a:buFont typeface="Arial"/>
+        <a:buFont typeface="Arial" panose="020B0604020202020204" pitchFamily="34" charset="0"/>
         <a:buChar char="•"/>
-        <a:defRPr sz="1800" kern="1200">
+        <a:defRPr sz="960" kern="1200">
           <a:solidFill>
             <a:schemeClr val="tx1"/>
           </a:solidFill>
@@ -2857,8 +2806,8 @@
       <a:defPPr>
         <a:defRPr lang="en-US"/>
       </a:defPPr>
-      <a:lvl1pPr marL="0" algn="l" defTabSz="914400" rtl="0" eaLnBrk="1" latinLnBrk="0" hangingPunct="1">
-        <a:defRPr sz="1800" kern="1200">
+      <a:lvl1pPr marL="0" algn="l" defTabSz="487650" rtl="0" eaLnBrk="1" latinLnBrk="0" hangingPunct="1">
+        <a:defRPr sz="960" kern="1200">
           <a:solidFill>
             <a:schemeClr val="tx1"/>
           </a:solidFill>
@@ -2867,8 +2816,8 @@
           <a:cs typeface="+mn-cs"/>
         </a:defRPr>
       </a:lvl1pPr>
-      <a:lvl2pPr marL="457200" algn="l" defTabSz="914400" rtl="0" eaLnBrk="1" latinLnBrk="0" hangingPunct="1">
-        <a:defRPr sz="1800" kern="1200">
+      <a:lvl2pPr marL="243825" algn="l" defTabSz="487650" rtl="0" eaLnBrk="1" latinLnBrk="0" hangingPunct="1">
+        <a:defRPr sz="960" kern="1200">
           <a:solidFill>
             <a:schemeClr val="tx1"/>
           </a:solidFill>
@@ -2877,8 +2826,8 @@
           <a:cs typeface="+mn-cs"/>
         </a:defRPr>
       </a:lvl2pPr>
-      <a:lvl3pPr marL="914400" algn="l" defTabSz="914400" rtl="0" eaLnBrk="1" latinLnBrk="0" hangingPunct="1">
-        <a:defRPr sz="1800" kern="1200">
+      <a:lvl3pPr marL="487650" algn="l" defTabSz="487650" rtl="0" eaLnBrk="1" latinLnBrk="0" hangingPunct="1">
+        <a:defRPr sz="960" kern="1200">
           <a:solidFill>
             <a:schemeClr val="tx1"/>
           </a:solidFill>
@@ -2887,8 +2836,8 @@
           <a:cs typeface="+mn-cs"/>
         </a:defRPr>
       </a:lvl3pPr>
-      <a:lvl4pPr marL="1371600" algn="l" defTabSz="914400" rtl="0" eaLnBrk="1" latinLnBrk="0" hangingPunct="1">
-        <a:defRPr sz="1800" kern="1200">
+      <a:lvl4pPr marL="731474" algn="l" defTabSz="487650" rtl="0" eaLnBrk="1" latinLnBrk="0" hangingPunct="1">
+        <a:defRPr sz="960" kern="1200">
           <a:solidFill>
             <a:schemeClr val="tx1"/>
           </a:solidFill>
@@ -2897,8 +2846,8 @@
           <a:cs typeface="+mn-cs"/>
         </a:defRPr>
       </a:lvl4pPr>
-      <a:lvl5pPr marL="1828800" algn="l" defTabSz="914400" rtl="0" eaLnBrk="1" latinLnBrk="0" hangingPunct="1">
-        <a:defRPr sz="1800" kern="1200">
+      <a:lvl5pPr marL="975299" algn="l" defTabSz="487650" rtl="0" eaLnBrk="1" latinLnBrk="0" hangingPunct="1">
+        <a:defRPr sz="960" kern="1200">
           <a:solidFill>
             <a:schemeClr val="tx1"/>
           </a:solidFill>
@@ -2907,8 +2856,8 @@
           <a:cs typeface="+mn-cs"/>
         </a:defRPr>
       </a:lvl5pPr>
-      <a:lvl6pPr marL="2286000" algn="l" defTabSz="914400" rtl="0" eaLnBrk="1" latinLnBrk="0" hangingPunct="1">
-        <a:defRPr sz="1800" kern="1200">
+      <a:lvl6pPr marL="1219124" algn="l" defTabSz="487650" rtl="0" eaLnBrk="1" latinLnBrk="0" hangingPunct="1">
+        <a:defRPr sz="960" kern="1200">
           <a:solidFill>
             <a:schemeClr val="tx1"/>
           </a:solidFill>
@@ -2917,8 +2866,8 @@
           <a:cs typeface="+mn-cs"/>
         </a:defRPr>
       </a:lvl6pPr>
-      <a:lvl7pPr marL="2743200" algn="l" defTabSz="914400" rtl="0" eaLnBrk="1" latinLnBrk="0" hangingPunct="1">
-        <a:defRPr sz="1800" kern="1200">
+      <a:lvl7pPr marL="1462949" algn="l" defTabSz="487650" rtl="0" eaLnBrk="1" latinLnBrk="0" hangingPunct="1">
+        <a:defRPr sz="960" kern="1200">
           <a:solidFill>
             <a:schemeClr val="tx1"/>
           </a:solidFill>
@@ -2927,8 +2876,8 @@
           <a:cs typeface="+mn-cs"/>
         </a:defRPr>
       </a:lvl7pPr>
-      <a:lvl8pPr marL="3200400" algn="l" defTabSz="914400" rtl="0" eaLnBrk="1" latinLnBrk="0" hangingPunct="1">
-        <a:defRPr sz="1800" kern="1200">
+      <a:lvl8pPr marL="1706773" algn="l" defTabSz="487650" rtl="0" eaLnBrk="1" latinLnBrk="0" hangingPunct="1">
+        <a:defRPr sz="960" kern="1200">
           <a:solidFill>
             <a:schemeClr val="tx1"/>
           </a:solidFill>
@@ -2937,8 +2886,8 @@
           <a:cs typeface="+mn-cs"/>
         </a:defRPr>
       </a:lvl8pPr>
-      <a:lvl9pPr marL="3657600" algn="l" defTabSz="914400" rtl="0" eaLnBrk="1" latinLnBrk="0" hangingPunct="1">
-        <a:defRPr sz="1800" kern="1200">
+      <a:lvl9pPr marL="1950598" algn="l" defTabSz="487650" rtl="0" eaLnBrk="1" latinLnBrk="0" hangingPunct="1">
+        <a:defRPr sz="960" kern="1200">
           <a:solidFill>
             <a:schemeClr val="tx1"/>
           </a:solidFill>
@@ -2978,14 +2927,14 @@
           <p:nvPr>
             <p:extLst>
               <p:ext uri="{D42A27DB-BD31-4B8C-83A1-F6EECF244321}">
-                <p14:modId xmlns:p14="http://schemas.microsoft.com/office/powerpoint/2010/main" val="1033660415"/>
+                <p14:modId xmlns:p14="http://schemas.microsoft.com/office/powerpoint/2010/main" val="736073710"/>
               </p:ext>
             </p:extLst>
           </p:nvPr>
         </p:nvGraphicFramePr>
         <p:xfrm>
-          <a:off x="1" y="-1"/>
-          <a:ext cx="12192000" cy="6858001"/>
+          <a:off x="1" y="0"/>
+          <a:ext cx="10972799" cy="3657600"/>
         </p:xfrm>
         <a:graphic>
           <a:graphicData uri="http://schemas.openxmlformats.org/drawingml/2006/table">
@@ -2994,11 +2943,13 @@
                 <a:tableStyleId>{793D81CF-94F2-401A-BA57-92F5A7B2D0C5}</a:tableStyleId>
               </a:tblPr>
               <a:tblGrid>
-                <a:gridCol w="3831770"/>
-                <a:gridCol w="4948859"/>
-                <a:gridCol w="3411371"/>
+                <a:gridCol w="2123267"/>
+                <a:gridCol w="3332135"/>
+                <a:gridCol w="1446180"/>
+                <a:gridCol w="2753861"/>
+                <a:gridCol w="1317356"/>
               </a:tblGrid>
-              <a:tr h="1127111">
+              <a:tr h="977884">
                 <a:tc>
                   <a:txBody>
                     <a:bodyPr/>
@@ -3006,7 +2957,7 @@
                     <a:p>
                       <a:pPr algn="ctr"/>
                       <a:r>
-                        <a:rPr lang="en-US" sz="2800" dirty="0" smtClean="0">
+                        <a:rPr lang="en-US" sz="2000" dirty="0" smtClean="0">
                           <a:solidFill>
                             <a:sysClr val="windowText" lastClr="000000"/>
                           </a:solidFill>
@@ -3017,7 +2968,7 @@
                         </a:rPr>
                         <a:t>Model</a:t>
                       </a:r>
-                      <a:endParaRPr lang="en-US" sz="2800" dirty="0">
+                      <a:endParaRPr lang="en-US" sz="2000" dirty="0">
                         <a:solidFill>
                           <a:sysClr val="windowText" lastClr="000000"/>
                         </a:solidFill>
@@ -3028,7 +2979,7 @@
                       </a:endParaRPr>
                     </a:p>
                   </a:txBody>
-                  <a:tcPr marL="38100" marR="38100" marB="19050" anchor="ctr">
+                  <a:tcPr marL="50800" marR="50800" marT="60960" marB="25400" anchor="ctr">
                     <a:lnR w="12700" cap="flat" cmpd="sng" algn="ctr">
                       <a:solidFill>
                         <a:schemeClr val="tx1"/>
@@ -3064,7 +3015,7 @@
                         <a:defRPr/>
                       </a:pPr>
                       <a:r>
-                        <a:rPr lang="el-GR" sz="2800" dirty="0" smtClean="0">
+                        <a:rPr lang="el-GR" sz="2000" dirty="0" smtClean="0">
                           <a:solidFill>
                             <a:sysClr val="windowText" lastClr="000000"/>
                           </a:solidFill>
@@ -3075,7 +3026,7 @@
                         <a:t>Β</a:t>
                       </a:r>
                       <a:r>
-                        <a:rPr lang="en-US" sz="2800" baseline="-25000" dirty="0" smtClean="0">
+                        <a:rPr lang="en-US" sz="2000" baseline="-25000" dirty="0" smtClean="0">
                           <a:solidFill>
                             <a:sysClr val="windowText" lastClr="000000"/>
                           </a:solidFill>
@@ -3086,7 +3037,7 @@
                         <a:t>1</a:t>
                       </a:r>
                       <a:r>
-                        <a:rPr lang="en-US" sz="2800" baseline="0" dirty="0" smtClean="0">
+                        <a:rPr lang="en-US" sz="2000" baseline="0" dirty="0" smtClean="0">
                           <a:solidFill>
                             <a:sysClr val="windowText" lastClr="000000"/>
                           </a:solidFill>
@@ -3096,7 +3047,7 @@
                         </a:rPr>
                         <a:t> (Phylogenetic Distance)</a:t>
                       </a:r>
-                      <a:endParaRPr lang="en-US" sz="2800" dirty="0" smtClean="0">
+                      <a:endParaRPr lang="en-US" sz="2000" dirty="0" smtClean="0">
                         <a:solidFill>
                           <a:sysClr val="windowText" lastClr="000000"/>
                         </a:solidFill>
@@ -3107,7 +3058,174 @@
                       </a:endParaRPr>
                     </a:p>
                   </a:txBody>
-                  <a:tcPr marL="38100" marR="38100" marB="19050" anchor="ctr">
+                  <a:tcPr marL="50800" marR="50800" marT="60960" marB="25400" anchor="ctr">
+                    <a:lnL w="12700" cap="flat" cmpd="sng" algn="ctr">
+                      <a:solidFill>
+                        <a:schemeClr val="tx1"/>
+                      </a:solidFill>
+                      <a:prstDash val="solid"/>
+                      <a:round/>
+                      <a:headEnd type="none" w="med" len="med"/>
+                      <a:tailEnd type="none" w="med" len="med"/>
+                    </a:lnL>
+                    <a:lnR w="12700" cap="flat" cmpd="sng" algn="ctr">
+                      <a:solidFill>
+                        <a:schemeClr val="tx1"/>
+                      </a:solidFill>
+                      <a:prstDash val="solid"/>
+                      <a:round/>
+                      <a:headEnd type="none" w="med" len="med"/>
+                      <a:tailEnd type="none" w="med" len="med"/>
+                    </a:lnR>
+                    <a:noFill/>
+                  </a:tcPr>
+                </a:tc>
+                <a:tc>
+                  <a:txBody>
+                    <a:bodyPr/>
+                    <a:lstStyle/>
+                    <a:p>
+                      <a:pPr marL="0" marR="0" lvl="0" indent="0" algn="ctr" defTabSz="914400" rtl="0" eaLnBrk="1" fontAlgn="auto" latinLnBrk="0" hangingPunct="1">
+                        <a:lnSpc>
+                          <a:spcPct val="100000"/>
+                        </a:lnSpc>
+                        <a:spcBef>
+                          <a:spcPts val="0"/>
+                        </a:spcBef>
+                        <a:spcAft>
+                          <a:spcPts val="0"/>
+                        </a:spcAft>
+                        <a:buClrTx/>
+                        <a:buSzTx/>
+                        <a:buFontTx/>
+                        <a:buNone/>
+                        <a:tabLst/>
+                        <a:defRPr/>
+                      </a:pPr>
+                      <a:r>
+                        <a:rPr lang="en-US" sz="2000" dirty="0" smtClean="0">
+                          <a:solidFill>
+                            <a:sysClr val="windowText" lastClr="000000"/>
+                          </a:solidFill>
+                          <a:effectLst/>
+                          <a:latin typeface="Arial" charset="0"/>
+                          <a:ea typeface="Arial" charset="0"/>
+                          <a:cs typeface="Arial" charset="0"/>
+                        </a:rPr>
+                        <a:t>p-</a:t>
+                      </a:r>
+                      <a:r>
+                        <a:rPr lang="en-US" sz="2000" baseline="0" dirty="0" smtClean="0">
+                          <a:solidFill>
+                            <a:sysClr val="windowText" lastClr="000000"/>
+                          </a:solidFill>
+                          <a:effectLst/>
+                          <a:latin typeface="Arial" charset="0"/>
+                          <a:ea typeface="Arial" charset="0"/>
+                          <a:cs typeface="Arial" charset="0"/>
+                        </a:rPr>
+                        <a:t>value</a:t>
+                      </a:r>
+                      <a:endParaRPr lang="en-US" sz="2000" dirty="0" smtClean="0">
+                        <a:solidFill>
+                          <a:sysClr val="windowText" lastClr="000000"/>
+                        </a:solidFill>
+                        <a:effectLst/>
+                        <a:latin typeface="Arial" charset="0"/>
+                        <a:ea typeface="Arial" charset="0"/>
+                        <a:cs typeface="Arial" charset="0"/>
+                      </a:endParaRPr>
+                    </a:p>
+                  </a:txBody>
+                  <a:tcPr marL="50800" marR="50800" marT="60960" marB="25400" anchor="ctr">
+                    <a:lnL w="12700" cap="flat" cmpd="sng" algn="ctr">
+                      <a:solidFill>
+                        <a:schemeClr val="tx1"/>
+                      </a:solidFill>
+                      <a:prstDash val="solid"/>
+                      <a:round/>
+                      <a:headEnd type="none" w="med" len="med"/>
+                      <a:tailEnd type="none" w="med" len="med"/>
+                    </a:lnL>
+                    <a:lnR w="12700" cap="flat" cmpd="sng" algn="ctr">
+                      <a:solidFill>
+                        <a:schemeClr val="tx1"/>
+                      </a:solidFill>
+                      <a:prstDash val="solid"/>
+                      <a:round/>
+                      <a:headEnd type="none" w="med" len="med"/>
+                      <a:tailEnd type="none" w="med" len="med"/>
+                    </a:lnR>
+                    <a:noFill/>
+                  </a:tcPr>
+                </a:tc>
+                <a:tc>
+                  <a:txBody>
+                    <a:bodyPr/>
+                    <a:lstStyle/>
+                    <a:p>
+                      <a:pPr marL="0" marR="0" lvl="0" indent="0" algn="ctr" defTabSz="914400" rtl="0" eaLnBrk="1" fontAlgn="auto" latinLnBrk="0" hangingPunct="1">
+                        <a:lnSpc>
+                          <a:spcPct val="100000"/>
+                        </a:lnSpc>
+                        <a:spcBef>
+                          <a:spcPts val="0"/>
+                        </a:spcBef>
+                        <a:spcAft>
+                          <a:spcPts val="0"/>
+                        </a:spcAft>
+                        <a:buClrTx/>
+                        <a:buSzTx/>
+                        <a:buFontTx/>
+                        <a:buNone/>
+                        <a:tabLst/>
+                        <a:defRPr/>
+                      </a:pPr>
+                      <a:r>
+                        <a:rPr lang="el-GR" sz="2000" dirty="0" smtClean="0">
+                          <a:solidFill>
+                            <a:sysClr val="windowText" lastClr="000000"/>
+                          </a:solidFill>
+                          <a:latin typeface="Arial" charset="0"/>
+                          <a:ea typeface="Arial" charset="0"/>
+                          <a:cs typeface="Arial" charset="0"/>
+                        </a:rPr>
+                        <a:t>Β</a:t>
+                      </a:r>
+                      <a:r>
+                        <a:rPr lang="en-US" sz="2000" baseline="-25000" dirty="0" smtClean="0">
+                          <a:solidFill>
+                            <a:sysClr val="windowText" lastClr="000000"/>
+                          </a:solidFill>
+                          <a:latin typeface="Arial" charset="0"/>
+                          <a:ea typeface="Arial" charset="0"/>
+                          <a:cs typeface="Arial" charset="0"/>
+                        </a:rPr>
+                        <a:t>2</a:t>
+                      </a:r>
+                      <a:r>
+                        <a:rPr lang="en-US" sz="2000" baseline="0" dirty="0" smtClean="0">
+                          <a:solidFill>
+                            <a:sysClr val="windowText" lastClr="000000"/>
+                          </a:solidFill>
+                          <a:latin typeface="Arial" charset="0"/>
+                          <a:ea typeface="Arial" charset="0"/>
+                          <a:cs typeface="Arial" charset="0"/>
+                        </a:rPr>
+                        <a:t> (Search Effort)</a:t>
+                      </a:r>
+                      <a:endParaRPr lang="en-US" sz="2000" dirty="0" smtClean="0">
+                        <a:solidFill>
+                          <a:sysClr val="windowText" lastClr="000000"/>
+                        </a:solidFill>
+                        <a:effectLst/>
+                        <a:latin typeface="Arial" charset="0"/>
+                        <a:ea typeface="Arial" charset="0"/>
+                        <a:cs typeface="Arial" charset="0"/>
+                      </a:endParaRPr>
+                    </a:p>
+                  </a:txBody>
+                  <a:tcPr marL="50800" marR="50800" marT="60960" marB="25400" anchor="ctr">
                     <a:lnL w="12700" cap="flat" cmpd="sng" algn="ctr">
                       <a:solidFill>
                         <a:schemeClr val="tx1"/>
@@ -3136,7 +3254,7 @@
                     <a:p>
                       <a:pPr algn="ctr"/>
                       <a:r>
-                        <a:rPr lang="en-US" sz="2800" dirty="0" smtClean="0">
+                        <a:rPr lang="en-US" sz="2000" dirty="0" smtClean="0">
                           <a:solidFill>
                             <a:sysClr val="windowText" lastClr="000000"/>
                           </a:solidFill>
@@ -3148,7 +3266,7 @@
                         <a:t>p-</a:t>
                       </a:r>
                       <a:r>
-                        <a:rPr lang="en-US" sz="2800" baseline="0" dirty="0" smtClean="0">
+                        <a:rPr lang="en-US" sz="2000" baseline="0" dirty="0" smtClean="0">
                           <a:solidFill>
                             <a:sysClr val="windowText" lastClr="000000"/>
                           </a:solidFill>
@@ -3159,7 +3277,7 @@
                         </a:rPr>
                         <a:t>value</a:t>
                       </a:r>
-                      <a:endParaRPr lang="en-US" sz="2800" dirty="0" smtClean="0">
+                      <a:endParaRPr lang="en-US" sz="2000" dirty="0" smtClean="0">
                         <a:solidFill>
                           <a:sysClr val="windowText" lastClr="000000"/>
                         </a:solidFill>
@@ -3170,7 +3288,7 @@
                       </a:endParaRPr>
                     </a:p>
                   </a:txBody>
-                  <a:tcPr marL="38100" marR="38100" marB="19050" anchor="ctr">
+                  <a:tcPr marL="50800" marR="50800" marT="60960" marB="25400" anchor="ctr">
                     <a:lnL w="12700" cap="flat" cmpd="sng" algn="ctr">
                       <a:solidFill>
                         <a:schemeClr val="tx1"/>
@@ -3184,7 +3302,7 @@
                   </a:tcPr>
                 </a:tc>
               </a:tr>
-              <a:tr h="860665">
+              <a:tr h="618967">
                 <a:tc>
                   <a:txBody>
                     <a:bodyPr/>
@@ -3192,17 +3310,23 @@
                     <a:p>
                       <a:pPr algn="ctr"/>
                       <a:r>
-                        <a:rPr lang="en-US" sz="2000" dirty="0">
+                        <a:rPr lang="en-US" sz="1800" b="0" dirty="0" smtClean="0">
                           <a:effectLst/>
                           <a:latin typeface="Arial" charset="0"/>
                           <a:ea typeface="Arial" charset="0"/>
                           <a:cs typeface="Arial" charset="0"/>
                         </a:rPr>
-                        <a:t>All</a:t>
+                        <a:t>Non-Pathogenic</a:t>
                       </a:r>
+                      <a:endParaRPr lang="en-US" sz="1800" b="0" dirty="0">
+                        <a:effectLst/>
+                        <a:latin typeface="Arial" charset="0"/>
+                        <a:ea typeface="Arial" charset="0"/>
+                        <a:cs typeface="Arial" charset="0"/>
+                      </a:endParaRPr>
                     </a:p>
                   </a:txBody>
-                  <a:tcPr marL="38100" marR="38100" marT="12700" marB="12700" anchor="ctr">
+                  <a:tcPr marL="50800" marR="50800" marT="16933" marB="16933" anchor="ctr">
                     <a:lnR w="12700" cap="flat" cmpd="sng" algn="ctr">
                       <a:solidFill>
                         <a:schemeClr val="tx1"/>
@@ -3221,17 +3345,17 @@
                     <a:p>
                       <a:pPr algn="ctr"/>
                       <a:r>
-                        <a:rPr lang="pt-BR" sz="2000" dirty="0">
+                        <a:rPr lang="pt-BR" sz="1800" dirty="0">
                           <a:effectLst/>
                           <a:latin typeface="Arial" charset="0"/>
                           <a:ea typeface="Arial" charset="0"/>
                           <a:cs typeface="Arial" charset="0"/>
                         </a:rPr>
-                        <a:t>-0.6643</a:t>
+                        <a:t>-0.83</a:t>
                       </a:r>
                     </a:p>
                   </a:txBody>
-                  <a:tcPr marL="38100" marR="38100" marT="12700" marB="12700" anchor="ctr">
+                  <a:tcPr marL="31750" marR="31750" marT="25400" marB="25400" anchor="ctr">
                     <a:lnL w="12700" cap="flat" cmpd="sng" algn="ctr">
                       <a:solidFill>
                         <a:schemeClr val="tx1"/>
@@ -3259,16 +3383,16 @@
                     <a:p>
                       <a:pPr algn="ctr"/>
                       <a:r>
-                        <a:rPr lang="is-IS" sz="2000" dirty="0" smtClean="0">
+                        <a:rPr lang="tr-TR" sz="1800" dirty="0" smtClean="0">
                           <a:effectLst/>
                           <a:latin typeface="Arial" charset="0"/>
                           <a:ea typeface="Arial" charset="0"/>
                           <a:cs typeface="Arial" charset="0"/>
                         </a:rPr>
-                        <a:t>9.72</a:t>
+                        <a:t>9.12</a:t>
                       </a:r>
                       <a:r>
-                        <a:rPr lang="is-IS" sz="2000" baseline="0" dirty="0" smtClean="0">
+                        <a:rPr lang="tr-TR" sz="1800" baseline="0" dirty="0" smtClean="0">
                           <a:effectLst/>
                           <a:latin typeface="Arial" charset="0"/>
                           <a:ea typeface="Arial" charset="0"/>
@@ -3277,15 +3401,15 @@
                         <a:t> </a:t>
                       </a:r>
                       <a:r>
-                        <a:rPr lang="is-IS" sz="2000" dirty="0" smtClean="0">
+                        <a:rPr lang="tr-TR" sz="1800" dirty="0" smtClean="0">
                           <a:effectLst/>
                           <a:latin typeface="Arial" charset="0"/>
                           <a:ea typeface="Arial" charset="0"/>
                           <a:cs typeface="Arial" charset="0"/>
                         </a:rPr>
-                        <a:t>e-36 **</a:t>
+                        <a:t>e-31</a:t>
                       </a:r>
-                      <a:endParaRPr lang="is-IS" sz="2000" dirty="0">
+                      <a:endParaRPr lang="tr-TR" sz="1800" dirty="0">
                         <a:effectLst/>
                         <a:latin typeface="Arial" charset="0"/>
                         <a:ea typeface="Arial" charset="0"/>
@@ -3293,73 +3417,7 @@
                       </a:endParaRPr>
                     </a:p>
                   </a:txBody>
-                  <a:tcPr marL="38100" marR="38100" marT="12700" marB="12700" anchor="ctr">
-                    <a:lnL w="12700" cap="flat" cmpd="sng" algn="ctr">
-                      <a:solidFill>
-                        <a:schemeClr val="tx1"/>
-                      </a:solidFill>
-                      <a:prstDash val="solid"/>
-                      <a:round/>
-                      <a:headEnd type="none" w="med" len="med"/>
-                      <a:tailEnd type="none" w="med" len="med"/>
-                    </a:lnL>
-                  </a:tcPr>
-                </a:tc>
-              </a:tr>
-              <a:tr h="860665">
-                <a:tc>
-                  <a:txBody>
-                    <a:bodyPr/>
-                    <a:lstStyle/>
-                    <a:p>
-                      <a:pPr algn="ctr"/>
-                      <a:r>
-                        <a:rPr lang="en-US" sz="2000" dirty="0" smtClean="0">
-                          <a:effectLst/>
-                          <a:latin typeface="Arial" charset="0"/>
-                          <a:ea typeface="Arial" charset="0"/>
-                          <a:cs typeface="Arial" charset="0"/>
-                        </a:rPr>
-                        <a:t>Necrotrophic</a:t>
-                      </a:r>
-                      <a:endParaRPr lang="en-US" sz="2000" dirty="0">
-                        <a:effectLst/>
-                        <a:latin typeface="Arial" charset="0"/>
-                        <a:ea typeface="Arial" charset="0"/>
-                        <a:cs typeface="Arial" charset="0"/>
-                      </a:endParaRPr>
-                    </a:p>
-                  </a:txBody>
-                  <a:tcPr marL="38100" marR="38100" marT="12700" marB="12700" anchor="ctr">
-                    <a:lnR w="12700" cap="flat" cmpd="sng" algn="ctr">
-                      <a:solidFill>
-                        <a:schemeClr val="tx1"/>
-                      </a:solidFill>
-                      <a:prstDash val="solid"/>
-                      <a:round/>
-                      <a:headEnd type="none" w="med" len="med"/>
-                      <a:tailEnd type="none" w="med" len="med"/>
-                    </a:lnR>
-                  </a:tcPr>
-                </a:tc>
-                <a:tc>
-                  <a:txBody>
-                    <a:bodyPr/>
-                    <a:lstStyle/>
-                    <a:p>
-                      <a:pPr algn="ctr"/>
-                      <a:r>
-                        <a:rPr lang="nb-NO" sz="2000" dirty="0">
-                          <a:effectLst/>
-                          <a:latin typeface="Arial" charset="0"/>
-                          <a:ea typeface="Arial" charset="0"/>
-                          <a:cs typeface="Arial" charset="0"/>
-                        </a:rPr>
-                        <a:t>-1.0357</a:t>
-                      </a:r>
-                    </a:p>
-                  </a:txBody>
-                  <a:tcPr marL="38100" marR="38100" marT="12700" marB="12700" anchor="ctr">
+                  <a:tcPr marL="31750" marR="31750" marT="25400" marB="25400" anchor="ctr">
                     <a:lnL w="12700" cap="flat" cmpd="sng" algn="ctr">
                       <a:solidFill>
                         <a:schemeClr val="tx1"/>
@@ -3387,143 +3445,17 @@
                     <a:p>
                       <a:pPr algn="ctr"/>
                       <a:r>
-                        <a:rPr lang="is-IS" sz="2000" dirty="0" smtClean="0">
+                        <a:rPr lang="hr-HR" sz="1800" dirty="0">
                           <a:effectLst/>
                           <a:latin typeface="Arial" charset="0"/>
                           <a:ea typeface="Arial" charset="0"/>
                           <a:cs typeface="Arial" charset="0"/>
                         </a:rPr>
-                        <a:t>1.22</a:t>
-                      </a:r>
-                      <a:r>
-                        <a:rPr lang="is-IS" sz="2000" baseline="0" dirty="0" smtClean="0">
-                          <a:effectLst/>
-                          <a:latin typeface="Arial" charset="0"/>
-                          <a:ea typeface="Arial" charset="0"/>
-                          <a:cs typeface="Arial" charset="0"/>
-                        </a:rPr>
-                        <a:t> </a:t>
-                      </a:r>
-                      <a:r>
-                        <a:rPr lang="is-IS" sz="2000" dirty="0" smtClean="0">
-                          <a:effectLst/>
-                          <a:latin typeface="Arial" charset="0"/>
-                          <a:ea typeface="Arial" charset="0"/>
-                          <a:cs typeface="Arial" charset="0"/>
-                        </a:rPr>
-                        <a:t>e-123 **</a:t>
-                      </a:r>
-                      <a:endParaRPr lang="is-IS" sz="2000" dirty="0">
-                        <a:effectLst/>
-                        <a:latin typeface="Arial" charset="0"/>
-                        <a:ea typeface="Arial" charset="0"/>
-                        <a:cs typeface="Arial" charset="0"/>
-                      </a:endParaRPr>
-                    </a:p>
-                  </a:txBody>
-                  <a:tcPr marL="38100" marR="38100" marT="12700" marB="12700" anchor="ctr">
-                    <a:lnL w="12700" cap="flat" cmpd="sng" algn="ctr">
-                      <a:solidFill>
-                        <a:schemeClr val="tx1"/>
-                      </a:solidFill>
-                      <a:prstDash val="solid"/>
-                      <a:round/>
-                      <a:headEnd type="none" w="med" len="med"/>
-                      <a:tailEnd type="none" w="med" len="med"/>
-                    </a:lnL>
-                  </a:tcPr>
-                </a:tc>
-              </a:tr>
-              <a:tr h="1002390">
-                <a:tc>
-                  <a:txBody>
-                    <a:bodyPr/>
-                    <a:lstStyle/>
-                    <a:p>
-                      <a:pPr algn="ctr"/>
-                      <a:r>
-                        <a:rPr lang="bg-BG" sz="2000" dirty="0" err="1" smtClean="0">
-                          <a:effectLst/>
-                          <a:latin typeface="Arial" charset="0"/>
-                          <a:ea typeface="Arial" charset="0"/>
-                          <a:cs typeface="Arial" charset="0"/>
-                        </a:rPr>
-                        <a:t>B</a:t>
-                      </a:r>
-                      <a:r>
-                        <a:rPr lang="en-US" sz="2000" dirty="0" err="1" smtClean="0">
-                          <a:effectLst/>
-                          <a:latin typeface="Arial" charset="0"/>
-                          <a:ea typeface="Arial" charset="0"/>
-                          <a:cs typeface="Arial" charset="0"/>
-                        </a:rPr>
-                        <a:t>iotrophic</a:t>
-                      </a:r>
-                      <a:r>
-                        <a:rPr lang="bg-BG" sz="2000" dirty="0" smtClean="0">
-                          <a:effectLst/>
-                          <a:latin typeface="Arial" charset="0"/>
-                          <a:ea typeface="Arial" charset="0"/>
-                          <a:cs typeface="Arial" charset="0"/>
-                        </a:rPr>
-                        <a:t>/</a:t>
-                      </a:r>
-                      <a:r>
-                        <a:rPr lang="bg-BG" sz="2000" dirty="0" err="1" smtClean="0">
-                          <a:effectLst/>
-                          <a:latin typeface="Arial" charset="0"/>
-                          <a:ea typeface="Arial" charset="0"/>
-                          <a:cs typeface="Arial" charset="0"/>
-                        </a:rPr>
-                        <a:t>H</a:t>
-                      </a:r>
-                      <a:r>
-                        <a:rPr lang="en-US" sz="2000" dirty="0" err="1" smtClean="0">
-                          <a:effectLst/>
-                          <a:latin typeface="Arial" charset="0"/>
-                          <a:ea typeface="Arial" charset="0"/>
-                          <a:cs typeface="Arial" charset="0"/>
-                        </a:rPr>
-                        <a:t>emitrophic</a:t>
-                      </a:r>
-                      <a:endParaRPr lang="bg-BG" sz="2000" dirty="0">
-                        <a:effectLst/>
-                        <a:latin typeface="Arial" charset="0"/>
-                        <a:ea typeface="Arial" charset="0"/>
-                        <a:cs typeface="Arial" charset="0"/>
-                      </a:endParaRPr>
-                    </a:p>
-                  </a:txBody>
-                  <a:tcPr marL="38100" marR="38100" marT="12700" marB="12700" anchor="ctr">
-                    <a:lnR w="12700" cap="flat" cmpd="sng" algn="ctr">
-                      <a:solidFill>
-                        <a:schemeClr val="tx1"/>
-                      </a:solidFill>
-                      <a:prstDash val="solid"/>
-                      <a:round/>
-                      <a:headEnd type="none" w="med" len="med"/>
-                      <a:tailEnd type="none" w="med" len="med"/>
-                    </a:lnR>
-                  </a:tcPr>
-                </a:tc>
-                <a:tc>
-                  <a:txBody>
-                    <a:bodyPr/>
-                    <a:lstStyle/>
-                    <a:p>
-                      <a:pPr algn="ctr"/>
-                      <a:r>
-                        <a:rPr lang="fi-FI" sz="2000" dirty="0">
-                          <a:effectLst/>
-                          <a:latin typeface="Arial" charset="0"/>
-                          <a:ea typeface="Arial" charset="0"/>
-                          <a:cs typeface="Arial" charset="0"/>
-                        </a:rPr>
-                        <a:t>-1.0887</a:t>
+                        <a:t>6.406</a:t>
                       </a:r>
                     </a:p>
                   </a:txBody>
-                  <a:tcPr marL="38100" marR="38100" marT="12700" marB="12700" anchor="ctr">
+                  <a:tcPr marL="31750" marR="31750" marT="25400" marB="25400" anchor="ctr">
                     <a:lnL w="12700" cap="flat" cmpd="sng" algn="ctr">
                       <a:solidFill>
                         <a:schemeClr val="tx1"/>
@@ -3551,16 +3483,16 @@
                     <a:p>
                       <a:pPr algn="ctr"/>
                       <a:r>
-                        <a:rPr lang="is-IS" sz="2000" dirty="0" smtClean="0">
+                        <a:rPr lang="cs-CZ" sz="1800" dirty="0" smtClean="0">
                           <a:effectLst/>
                           <a:latin typeface="Arial" charset="0"/>
                           <a:ea typeface="Arial" charset="0"/>
                           <a:cs typeface="Arial" charset="0"/>
                         </a:rPr>
-                        <a:t>2.44</a:t>
+                        <a:t>4.66</a:t>
                       </a:r>
                       <a:r>
-                        <a:rPr lang="is-IS" sz="2000" baseline="0" dirty="0" smtClean="0">
+                        <a:rPr lang="cs-CZ" sz="1800" baseline="0" dirty="0" smtClean="0">
                           <a:effectLst/>
                           <a:latin typeface="Arial" charset="0"/>
                           <a:ea typeface="Arial" charset="0"/>
@@ -3569,24 +3501,15 @@
                         <a:t> </a:t>
                       </a:r>
                       <a:r>
-                        <a:rPr lang="is-IS" sz="2000" dirty="0" smtClean="0">
+                        <a:rPr lang="cs-CZ" sz="1800" dirty="0" smtClean="0">
                           <a:effectLst/>
                           <a:latin typeface="Arial" charset="0"/>
                           <a:ea typeface="Arial" charset="0"/>
                           <a:cs typeface="Arial" charset="0"/>
                         </a:rPr>
-                        <a:t>e-15</a:t>
+                        <a:t>e-19</a:t>
                       </a:r>
-                      <a:r>
-                        <a:rPr lang="is-IS" sz="2000" baseline="0" dirty="0" smtClean="0">
-                          <a:effectLst/>
-                          <a:latin typeface="Arial" charset="0"/>
-                          <a:ea typeface="Arial" charset="0"/>
-                          <a:cs typeface="Arial" charset="0"/>
-                        </a:rPr>
-                        <a:t> **</a:t>
-                      </a:r>
-                      <a:endParaRPr lang="is-IS" sz="2000" dirty="0">
+                      <a:endParaRPr lang="cs-CZ" sz="1800" dirty="0">
                         <a:effectLst/>
                         <a:latin typeface="Arial" charset="0"/>
                         <a:ea typeface="Arial" charset="0"/>
@@ -3594,7 +3517,7 @@
                       </a:endParaRPr>
                     </a:p>
                   </a:txBody>
-                  <a:tcPr marL="38100" marR="38100" marT="12700" marB="12700" anchor="ctr">
+                  <a:tcPr marL="31750" marR="31750" marT="25400" marB="25400" anchor="ctr">
                     <a:lnL w="12700" cap="flat" cmpd="sng" algn="ctr">
                       <a:solidFill>
                         <a:schemeClr val="tx1"/>
@@ -3607,7 +3530,7 @@
                   </a:tcPr>
                 </a:tc>
               </a:tr>
-              <a:tr h="1002390">
+              <a:tr h="618967">
                 <a:tc>
                   <a:txBody>
                     <a:bodyPr/>
@@ -3615,15 +3538,15 @@
                     <a:p>
                       <a:pPr algn="ctr"/>
                       <a:r>
-                        <a:rPr lang="en-US" sz="2000" dirty="0" err="1" smtClean="0">
+                        <a:rPr lang="en-US" sz="1800" b="0" dirty="0" smtClean="0">
                           <a:effectLst/>
                           <a:latin typeface="Arial" charset="0"/>
                           <a:ea typeface="Arial" charset="0"/>
                           <a:cs typeface="Arial" charset="0"/>
                         </a:rPr>
-                        <a:t>Hemitrophic</a:t>
+                        <a:t>Necrotrophic</a:t>
                       </a:r>
-                      <a:endParaRPr lang="en-US" sz="2000" dirty="0">
+                      <a:endParaRPr lang="en-US" sz="1800" b="0" dirty="0">
                         <a:effectLst/>
                         <a:latin typeface="Arial" charset="0"/>
                         <a:ea typeface="Arial" charset="0"/>
@@ -3631,7 +3554,7 @@
                       </a:endParaRPr>
                     </a:p>
                   </a:txBody>
-                  <a:tcPr marL="38100" marR="38100" marT="12700" marB="12700" anchor="ctr">
+                  <a:tcPr marL="50800" marR="50800" marT="16933" marB="16933" anchor="ctr">
                     <a:lnR w="12700" cap="flat" cmpd="sng" algn="ctr">
                       <a:solidFill>
                         <a:schemeClr val="tx1"/>
@@ -3650,17 +3573,17 @@
                     <a:p>
                       <a:pPr algn="ctr"/>
                       <a:r>
-                        <a:rPr lang="is-IS" sz="2000" dirty="0">
+                        <a:rPr lang="uk-UA" sz="1800" dirty="0">
                           <a:effectLst/>
                           <a:latin typeface="Arial" charset="0"/>
                           <a:ea typeface="Arial" charset="0"/>
                           <a:cs typeface="Arial" charset="0"/>
                         </a:rPr>
-                        <a:t>-1.2084</a:t>
+                        <a:t>-0.99</a:t>
                       </a:r>
                     </a:p>
                   </a:txBody>
-                  <a:tcPr marL="38100" marR="38100" marT="12700" marB="12700" anchor="ctr">
+                  <a:tcPr marL="31750" marR="31750" marT="25400" marB="25400" anchor="ctr">
                     <a:lnL w="12700" cap="flat" cmpd="sng" algn="ctr">
                       <a:solidFill>
                         <a:schemeClr val="tx1"/>
@@ -3688,33 +3611,15 @@
                     <a:p>
                       <a:pPr algn="ctr"/>
                       <a:r>
-                        <a:rPr lang="is-IS" sz="2000" dirty="0" smtClean="0">
+                        <a:rPr lang="nb-NO" sz="1800" dirty="0" smtClean="0">
                           <a:effectLst/>
                           <a:latin typeface="Arial" charset="0"/>
                           <a:ea typeface="Arial" charset="0"/>
                           <a:cs typeface="Arial" charset="0"/>
                         </a:rPr>
-                        <a:t>2.71</a:t>
+                        <a:t>8.99 e-119</a:t>
                       </a:r>
-                      <a:r>
-                        <a:rPr lang="is-IS" sz="2000" baseline="0" dirty="0" smtClean="0">
-                          <a:effectLst/>
-                          <a:latin typeface="Arial" charset="0"/>
-                          <a:ea typeface="Arial" charset="0"/>
-                          <a:cs typeface="Arial" charset="0"/>
-                        </a:rPr>
-                        <a:t> </a:t>
-                      </a:r>
-                      <a:r>
-                        <a:rPr lang="is-IS" sz="2000" dirty="0" smtClean="0">
-                          <a:effectLst/>
-                          <a:latin typeface="Arial" charset="0"/>
-                          <a:ea typeface="Arial" charset="0"/>
-                          <a:cs typeface="Arial" charset="0"/>
-                        </a:rPr>
-                        <a:t>e-35 **</a:t>
-                      </a:r>
-                      <a:endParaRPr lang="is-IS" sz="2000" dirty="0">
+                      <a:endParaRPr lang="nb-NO" sz="1800" dirty="0">
                         <a:effectLst/>
                         <a:latin typeface="Arial" charset="0"/>
                         <a:ea typeface="Arial" charset="0"/>
@@ -3722,98 +3627,7 @@
                       </a:endParaRPr>
                     </a:p>
                   </a:txBody>
-                  <a:tcPr marL="38100" marR="38100" marT="12700" marB="12700" anchor="ctr">
-                    <a:lnL w="12700" cap="flat" cmpd="sng" algn="ctr">
-                      <a:solidFill>
-                        <a:schemeClr val="tx1"/>
-                      </a:solidFill>
-                      <a:prstDash val="solid"/>
-                      <a:round/>
-                      <a:headEnd type="none" w="med" len="med"/>
-                      <a:tailEnd type="none" w="med" len="med"/>
-                    </a:lnL>
-                  </a:tcPr>
-                </a:tc>
-              </a:tr>
-              <a:tr h="1002390">
-                <a:tc>
-                  <a:txBody>
-                    <a:bodyPr/>
-                    <a:lstStyle/>
-                    <a:p>
-                      <a:pPr marL="0" marR="0" indent="0" algn="ctr" defTabSz="914400" rtl="0" eaLnBrk="1" fontAlgn="auto" latinLnBrk="0" hangingPunct="1">
-                        <a:lnSpc>
-                          <a:spcPct val="100000"/>
-                        </a:lnSpc>
-                        <a:spcBef>
-                          <a:spcPts val="0"/>
-                        </a:spcBef>
-                        <a:spcAft>
-                          <a:spcPts val="0"/>
-                        </a:spcAft>
-                        <a:buClrTx/>
-                        <a:buSzTx/>
-                        <a:buFontTx/>
-                        <a:buNone/>
-                        <a:tabLst/>
-                        <a:defRPr/>
-                      </a:pPr>
-                      <a:r>
-                        <a:rPr lang="en-US" sz="2000" dirty="0" smtClean="0">
-                          <a:effectLst/>
-                          <a:latin typeface="Arial" charset="0"/>
-                          <a:ea typeface="Arial" charset="0"/>
-                          <a:cs typeface="Arial" charset="0"/>
-                        </a:rPr>
-                        <a:t>Necrotrophic/</a:t>
-                      </a:r>
-                      <a:r>
-                        <a:rPr lang="en-US" sz="2000" dirty="0" err="1" smtClean="0">
-                          <a:effectLst/>
-                          <a:latin typeface="Arial" charset="0"/>
-                          <a:ea typeface="Arial" charset="0"/>
-                          <a:cs typeface="Arial" charset="0"/>
-                        </a:rPr>
-                        <a:t>Hemitrophic</a:t>
-                      </a:r>
-                      <a:endParaRPr lang="en-US" sz="2000" dirty="0" smtClean="0">
-                        <a:effectLst/>
-                        <a:latin typeface="Arial" charset="0"/>
-                        <a:ea typeface="Arial" charset="0"/>
-                        <a:cs typeface="Arial" charset="0"/>
-                      </a:endParaRPr>
-                    </a:p>
-                  </a:txBody>
-                  <a:tcPr marL="38100" marR="38100" marT="12700" marB="12700" anchor="ctr">
-                    <a:lnR w="12700" cap="flat" cmpd="sng" algn="ctr">
-                      <a:solidFill>
-                        <a:schemeClr val="tx1"/>
-                      </a:solidFill>
-                      <a:prstDash val="solid"/>
-                      <a:round/>
-                      <a:headEnd type="none" w="med" len="med"/>
-                      <a:tailEnd type="none" w="med" len="med"/>
-                    </a:lnR>
-                  </a:tcPr>
-                </a:tc>
-                <a:tc>
-                  <a:txBody>
-                    <a:bodyPr/>
-                    <a:lstStyle/>
-                    <a:p>
-                      <a:pPr algn="ctr"/>
-                      <a:r>
-                        <a:rPr lang="fi-FI" sz="2000" dirty="0">
-                          <a:effectLst/>
-                          <a:latin typeface="Arial" charset="0"/>
-                          <a:ea typeface="Arial" charset="0"/>
-                          <a:cs typeface="Arial" charset="0"/>
-                        </a:rPr>
-                        <a:t>-1.3791</a:t>
-                      </a:r>
-                    </a:p>
-                  </a:txBody>
-                  <a:tcPr marL="38100" marR="38100" marT="12700" marB="12700" anchor="ctr">
+                  <a:tcPr marL="31750" marR="31750" marT="25400" marB="25400" anchor="ctr">
                     <a:lnL w="12700" cap="flat" cmpd="sng" algn="ctr">
                       <a:solidFill>
                         <a:schemeClr val="tx1"/>
@@ -3841,107 +3655,17 @@
                     <a:p>
                       <a:pPr algn="ctr"/>
                       <a:r>
-                        <a:rPr lang="cs-CZ" sz="2000" dirty="0" smtClean="0">
+                        <a:rPr lang="nb-NO" sz="1800" dirty="0">
                           <a:effectLst/>
                           <a:latin typeface="Arial" charset="0"/>
                           <a:ea typeface="Arial" charset="0"/>
                           <a:cs typeface="Arial" charset="0"/>
                         </a:rPr>
-                        <a:t>2.25</a:t>
-                      </a:r>
-                      <a:r>
-                        <a:rPr lang="cs-CZ" sz="2000" baseline="0" dirty="0" smtClean="0">
-                          <a:effectLst/>
-                          <a:latin typeface="Arial" charset="0"/>
-                          <a:ea typeface="Arial" charset="0"/>
-                          <a:cs typeface="Arial" charset="0"/>
-                        </a:rPr>
-                        <a:t> </a:t>
-                      </a:r>
-                      <a:r>
-                        <a:rPr lang="cs-CZ" sz="2000" dirty="0" smtClean="0">
-                          <a:effectLst/>
-                          <a:latin typeface="Arial" charset="0"/>
-                          <a:ea typeface="Arial" charset="0"/>
-                          <a:cs typeface="Arial" charset="0"/>
-                        </a:rPr>
-                        <a:t>e-77 **</a:t>
-                      </a:r>
-                      <a:endParaRPr lang="cs-CZ" sz="2000" dirty="0">
-                        <a:effectLst/>
-                        <a:latin typeface="Arial" charset="0"/>
-                        <a:ea typeface="Arial" charset="0"/>
-                        <a:cs typeface="Arial" charset="0"/>
-                      </a:endParaRPr>
-                    </a:p>
-                  </a:txBody>
-                  <a:tcPr marL="38100" marR="38100" marT="12700" marB="12700" anchor="ctr">
-                    <a:lnL w="12700" cap="flat" cmpd="sng" algn="ctr">
-                      <a:solidFill>
-                        <a:schemeClr val="tx1"/>
-                      </a:solidFill>
-                      <a:prstDash val="solid"/>
-                      <a:round/>
-                      <a:headEnd type="none" w="med" len="med"/>
-                      <a:tailEnd type="none" w="med" len="med"/>
-                    </a:lnL>
-                  </a:tcPr>
-                </a:tc>
-              </a:tr>
-              <a:tr h="1002390">
-                <a:tc>
-                  <a:txBody>
-                    <a:bodyPr/>
-                    <a:lstStyle/>
-                    <a:p>
-                      <a:pPr algn="ctr"/>
-                      <a:r>
-                        <a:rPr lang="en-US" sz="2000" dirty="0" err="1" smtClean="0">
-                          <a:effectLst/>
-                          <a:latin typeface="Arial" charset="0"/>
-                          <a:ea typeface="Arial" charset="0"/>
-                          <a:cs typeface="Arial" charset="0"/>
-                        </a:rPr>
-                        <a:t>Biotrophic</a:t>
-                      </a:r>
-                      <a:endParaRPr lang="en-US" sz="2000" dirty="0">
-                        <a:effectLst/>
-                        <a:latin typeface="Arial" charset="0"/>
-                        <a:ea typeface="Arial" charset="0"/>
-                        <a:cs typeface="Arial" charset="0"/>
-                      </a:endParaRPr>
-                    </a:p>
-                  </a:txBody>
-                  <a:tcPr marL="38100" marR="38100" marT="12700" marB="12700" anchor="ctr">
-                    <a:lnR w="12700" cap="flat" cmpd="sng" algn="ctr">
-                      <a:solidFill>
-                        <a:schemeClr val="tx1"/>
-                      </a:solidFill>
-                      <a:prstDash val="solid"/>
-                      <a:round/>
-                      <a:headEnd type="none" w="med" len="med"/>
-                      <a:tailEnd type="none" w="med" len="med"/>
-                    </a:lnR>
-                  </a:tcPr>
-                </a:tc>
-                <a:tc>
-                  <a:txBody>
-                    <a:bodyPr/>
-                    <a:lstStyle/>
-                    <a:p>
-                      <a:pPr algn="ctr"/>
-                      <a:r>
-                        <a:rPr lang="nb-NO" sz="2000" dirty="0">
-                          <a:effectLst/>
-                          <a:latin typeface="Arial" charset="0"/>
-                          <a:ea typeface="Arial" charset="0"/>
-                          <a:cs typeface="Arial" charset="0"/>
-                        </a:rPr>
-                        <a:t>-1.3621</a:t>
+                        <a:t>7.295</a:t>
                       </a:r>
                     </a:p>
                   </a:txBody>
-                  <a:tcPr marL="38100" marR="38100" marT="12700" marB="12700" anchor="ctr">
+                  <a:tcPr marL="31750" marR="31750" marT="25400" marB="25400" anchor="ctr">
                     <a:lnL w="12700" cap="flat" cmpd="sng" algn="ctr">
                       <a:solidFill>
                         <a:schemeClr val="tx1"/>
@@ -3969,16 +3693,16 @@
                     <a:p>
                       <a:pPr algn="ctr"/>
                       <a:r>
-                        <a:rPr lang="is-IS" sz="2000" dirty="0" smtClean="0">
+                        <a:rPr lang="is-IS" sz="1800" dirty="0" smtClean="0">
                           <a:effectLst/>
                           <a:latin typeface="Arial" charset="0"/>
                           <a:ea typeface="Arial" charset="0"/>
                           <a:cs typeface="Arial" charset="0"/>
                         </a:rPr>
-                        <a:t>1.46</a:t>
+                        <a:t>4.70</a:t>
                       </a:r>
                       <a:r>
-                        <a:rPr lang="is-IS" sz="2000" baseline="0" dirty="0" smtClean="0">
+                        <a:rPr lang="is-IS" sz="1800" baseline="0" dirty="0" smtClean="0">
                           <a:effectLst/>
                           <a:latin typeface="Arial" charset="0"/>
                           <a:ea typeface="Arial" charset="0"/>
@@ -3987,15 +3711,15 @@
                         <a:t> </a:t>
                       </a:r>
                       <a:r>
-                        <a:rPr lang="is-IS" sz="2000" dirty="0" smtClean="0">
+                        <a:rPr lang="is-IS" sz="1800" dirty="0" smtClean="0">
                           <a:effectLst/>
                           <a:latin typeface="Arial" charset="0"/>
                           <a:ea typeface="Arial" charset="0"/>
                           <a:cs typeface="Arial" charset="0"/>
                         </a:rPr>
-                        <a:t>e-144 **</a:t>
+                        <a:t>e-70</a:t>
                       </a:r>
-                      <a:endParaRPr lang="is-IS" sz="2000" dirty="0">
+                      <a:endParaRPr lang="is-IS" sz="1800" dirty="0">
                         <a:effectLst/>
                         <a:latin typeface="Arial" charset="0"/>
                         <a:ea typeface="Arial" charset="0"/>
@@ -4003,7 +3727,463 @@
                       </a:endParaRPr>
                     </a:p>
                   </a:txBody>
-                  <a:tcPr marL="38100" marR="38100" marT="12700" marB="12700" anchor="ctr">
+                  <a:tcPr marL="31750" marR="31750" marT="25400" marB="25400" anchor="ctr">
+                    <a:lnL w="12700" cap="flat" cmpd="sng" algn="ctr">
+                      <a:solidFill>
+                        <a:schemeClr val="tx1"/>
+                      </a:solidFill>
+                      <a:prstDash val="solid"/>
+                      <a:round/>
+                      <a:headEnd type="none" w="med" len="med"/>
+                      <a:tailEnd type="none" w="med" len="med"/>
+                    </a:lnL>
+                  </a:tcPr>
+                </a:tc>
+              </a:tr>
+              <a:tr h="720891">
+                <a:tc>
+                  <a:txBody>
+                    <a:bodyPr/>
+                    <a:lstStyle/>
+                    <a:p>
+                      <a:pPr algn="ctr"/>
+                      <a:r>
+                        <a:rPr lang="en-US" sz="1800" b="0" dirty="0" err="1" smtClean="0">
+                          <a:effectLst/>
+                          <a:latin typeface="Arial" charset="0"/>
+                          <a:ea typeface="Arial" charset="0"/>
+                          <a:cs typeface="Arial" charset="0"/>
+                        </a:rPr>
+                        <a:t>Hemitrophic</a:t>
+                      </a:r>
+                      <a:endParaRPr lang="en-US" sz="1800" b="0" dirty="0">
+                        <a:effectLst/>
+                        <a:latin typeface="Arial" charset="0"/>
+                        <a:ea typeface="Arial" charset="0"/>
+                        <a:cs typeface="Arial" charset="0"/>
+                      </a:endParaRPr>
+                    </a:p>
+                  </a:txBody>
+                  <a:tcPr marL="50800" marR="50800" marT="16933" marB="16933" anchor="ctr">
+                    <a:lnR w="12700" cap="flat" cmpd="sng" algn="ctr">
+                      <a:solidFill>
+                        <a:schemeClr val="tx1"/>
+                      </a:solidFill>
+                      <a:prstDash val="solid"/>
+                      <a:round/>
+                      <a:headEnd type="none" w="med" len="med"/>
+                      <a:tailEnd type="none" w="med" len="med"/>
+                    </a:lnR>
+                  </a:tcPr>
+                </a:tc>
+                <a:tc>
+                  <a:txBody>
+                    <a:bodyPr/>
+                    <a:lstStyle/>
+                    <a:p>
+                      <a:pPr algn="ctr"/>
+                      <a:r>
+                        <a:rPr lang="hr-HR" sz="1800" dirty="0">
+                          <a:effectLst/>
+                          <a:latin typeface="Arial" charset="0"/>
+                          <a:ea typeface="Arial" charset="0"/>
+                          <a:cs typeface="Arial" charset="0"/>
+                        </a:rPr>
+                        <a:t>-1.22</a:t>
+                      </a:r>
+                    </a:p>
+                  </a:txBody>
+                  <a:tcPr marL="31750" marR="31750" marT="25400" marB="25400" anchor="ctr">
+                    <a:lnL w="12700" cap="flat" cmpd="sng" algn="ctr">
+                      <a:solidFill>
+                        <a:schemeClr val="tx1"/>
+                      </a:solidFill>
+                      <a:prstDash val="solid"/>
+                      <a:round/>
+                      <a:headEnd type="none" w="med" len="med"/>
+                      <a:tailEnd type="none" w="med" len="med"/>
+                    </a:lnL>
+                    <a:lnR w="12700" cap="flat" cmpd="sng" algn="ctr">
+                      <a:solidFill>
+                        <a:schemeClr val="tx1"/>
+                      </a:solidFill>
+                      <a:prstDash val="solid"/>
+                      <a:round/>
+                      <a:headEnd type="none" w="med" len="med"/>
+                      <a:tailEnd type="none" w="med" len="med"/>
+                    </a:lnR>
+                  </a:tcPr>
+                </a:tc>
+                <a:tc>
+                  <a:txBody>
+                    <a:bodyPr/>
+                    <a:lstStyle/>
+                    <a:p>
+                      <a:pPr algn="ctr"/>
+                      <a:r>
+                        <a:rPr lang="is-IS" sz="1800" dirty="0" smtClean="0">
+                          <a:effectLst/>
+                          <a:latin typeface="Arial" charset="0"/>
+                          <a:ea typeface="Arial" charset="0"/>
+                          <a:cs typeface="Arial" charset="0"/>
+                        </a:rPr>
+                        <a:t>3.29</a:t>
+                      </a:r>
+                      <a:r>
+                        <a:rPr lang="is-IS" sz="1800" baseline="0" dirty="0" smtClean="0">
+                          <a:effectLst/>
+                          <a:latin typeface="Arial" charset="0"/>
+                          <a:ea typeface="Arial" charset="0"/>
+                          <a:cs typeface="Arial" charset="0"/>
+                        </a:rPr>
+                        <a:t> </a:t>
+                      </a:r>
+                      <a:r>
+                        <a:rPr lang="is-IS" sz="1800" dirty="0" smtClean="0">
+                          <a:effectLst/>
+                          <a:latin typeface="Arial" charset="0"/>
+                          <a:ea typeface="Arial" charset="0"/>
+                          <a:cs typeface="Arial" charset="0"/>
+                        </a:rPr>
+                        <a:t>e-115</a:t>
+                      </a:r>
+                      <a:endParaRPr lang="is-IS" sz="1800" dirty="0">
+                        <a:effectLst/>
+                        <a:latin typeface="Arial" charset="0"/>
+                        <a:ea typeface="Arial" charset="0"/>
+                        <a:cs typeface="Arial" charset="0"/>
+                      </a:endParaRPr>
+                    </a:p>
+                  </a:txBody>
+                  <a:tcPr marL="31750" marR="31750" marT="25400" marB="25400" anchor="ctr">
+                    <a:lnL w="12700" cap="flat" cmpd="sng" algn="ctr">
+                      <a:solidFill>
+                        <a:schemeClr val="tx1"/>
+                      </a:solidFill>
+                      <a:prstDash val="solid"/>
+                      <a:round/>
+                      <a:headEnd type="none" w="med" len="med"/>
+                      <a:tailEnd type="none" w="med" len="med"/>
+                    </a:lnL>
+                    <a:lnR w="12700" cap="flat" cmpd="sng" algn="ctr">
+                      <a:solidFill>
+                        <a:schemeClr val="tx1"/>
+                      </a:solidFill>
+                      <a:prstDash val="solid"/>
+                      <a:round/>
+                      <a:headEnd type="none" w="med" len="med"/>
+                      <a:tailEnd type="none" w="med" len="med"/>
+                    </a:lnR>
+                  </a:tcPr>
+                </a:tc>
+                <a:tc>
+                  <a:txBody>
+                    <a:bodyPr/>
+                    <a:lstStyle/>
+                    <a:p>
+                      <a:pPr algn="ctr"/>
+                      <a:r>
+                        <a:rPr lang="hr-HR" sz="1800" dirty="0">
+                          <a:effectLst/>
+                          <a:latin typeface="Arial" charset="0"/>
+                          <a:ea typeface="Arial" charset="0"/>
+                          <a:cs typeface="Arial" charset="0"/>
+                        </a:rPr>
+                        <a:t>4.605</a:t>
+                      </a:r>
+                    </a:p>
+                  </a:txBody>
+                  <a:tcPr marL="31750" marR="31750" marT="25400" marB="25400" anchor="ctr">
+                    <a:lnL w="12700" cap="flat" cmpd="sng" algn="ctr">
+                      <a:solidFill>
+                        <a:schemeClr val="tx1"/>
+                      </a:solidFill>
+                      <a:prstDash val="solid"/>
+                      <a:round/>
+                      <a:headEnd type="none" w="med" len="med"/>
+                      <a:tailEnd type="none" w="med" len="med"/>
+                    </a:lnL>
+                    <a:lnR w="12700" cap="flat" cmpd="sng" algn="ctr">
+                      <a:solidFill>
+                        <a:schemeClr val="tx1"/>
+                      </a:solidFill>
+                      <a:prstDash val="solid"/>
+                      <a:round/>
+                      <a:headEnd type="none" w="med" len="med"/>
+                      <a:tailEnd type="none" w="med" len="med"/>
+                    </a:lnR>
+                  </a:tcPr>
+                </a:tc>
+                <a:tc>
+                  <a:txBody>
+                    <a:bodyPr/>
+                    <a:lstStyle/>
+                    <a:p>
+                      <a:pPr algn="ctr"/>
+                      <a:r>
+                        <a:rPr lang="is-IS" sz="1800" dirty="0" smtClean="0">
+                          <a:effectLst/>
+                          <a:latin typeface="Arial" charset="0"/>
+                          <a:ea typeface="Arial" charset="0"/>
+                          <a:cs typeface="Arial" charset="0"/>
+                        </a:rPr>
+                        <a:t>7.52</a:t>
+                      </a:r>
+                      <a:r>
+                        <a:rPr lang="is-IS" sz="1800" baseline="0" dirty="0" smtClean="0">
+                          <a:effectLst/>
+                          <a:latin typeface="Arial" charset="0"/>
+                          <a:ea typeface="Arial" charset="0"/>
+                          <a:cs typeface="Arial" charset="0"/>
+                        </a:rPr>
+                        <a:t> </a:t>
+                      </a:r>
+                      <a:r>
+                        <a:rPr lang="is-IS" sz="1800" dirty="0" smtClean="0">
+                          <a:effectLst/>
+                          <a:latin typeface="Arial" charset="0"/>
+                          <a:ea typeface="Arial" charset="0"/>
+                          <a:cs typeface="Arial" charset="0"/>
+                        </a:rPr>
+                        <a:t>e-23</a:t>
+                      </a:r>
+                      <a:endParaRPr lang="is-IS" sz="1800" dirty="0">
+                        <a:effectLst/>
+                        <a:latin typeface="Arial" charset="0"/>
+                        <a:ea typeface="Arial" charset="0"/>
+                        <a:cs typeface="Arial" charset="0"/>
+                      </a:endParaRPr>
+                    </a:p>
+                  </a:txBody>
+                  <a:tcPr marL="31750" marR="31750" marT="25400" marB="25400" anchor="ctr">
+                    <a:lnL w="12700" cap="flat" cmpd="sng" algn="ctr">
+                      <a:solidFill>
+                        <a:schemeClr val="tx1"/>
+                      </a:solidFill>
+                      <a:prstDash val="solid"/>
+                      <a:round/>
+                      <a:headEnd type="none" w="med" len="med"/>
+                      <a:tailEnd type="none" w="med" len="med"/>
+                    </a:lnL>
+                  </a:tcPr>
+                </a:tc>
+              </a:tr>
+              <a:tr h="720891">
+                <a:tc>
+                  <a:txBody>
+                    <a:bodyPr/>
+                    <a:lstStyle/>
+                    <a:p>
+                      <a:pPr algn="ctr"/>
+                      <a:r>
+                        <a:rPr lang="en-US" sz="1800" b="0" dirty="0" err="1" smtClean="0">
+                          <a:effectLst/>
+                          <a:latin typeface="Arial" charset="0"/>
+                          <a:ea typeface="Arial" charset="0"/>
+                          <a:cs typeface="Arial" charset="0"/>
+                        </a:rPr>
+                        <a:t>Biotrophic</a:t>
+                      </a:r>
+                      <a:endParaRPr lang="en-US" sz="1800" b="0" dirty="0">
+                        <a:effectLst/>
+                        <a:latin typeface="Arial" charset="0"/>
+                        <a:ea typeface="Arial" charset="0"/>
+                        <a:cs typeface="Arial" charset="0"/>
+                      </a:endParaRPr>
+                    </a:p>
+                  </a:txBody>
+                  <a:tcPr marL="50800" marR="50800" marT="16933" marB="16933" anchor="ctr">
+                    <a:lnR w="12700" cap="flat" cmpd="sng" algn="ctr">
+                      <a:solidFill>
+                        <a:schemeClr val="tx1"/>
+                      </a:solidFill>
+                      <a:prstDash val="solid"/>
+                      <a:round/>
+                      <a:headEnd type="none" w="med" len="med"/>
+                      <a:tailEnd type="none" w="med" len="med"/>
+                    </a:lnR>
+                  </a:tcPr>
+                </a:tc>
+                <a:tc>
+                  <a:txBody>
+                    <a:bodyPr/>
+                    <a:lstStyle/>
+                    <a:p>
+                      <a:pPr algn="ctr"/>
+                      <a:r>
+                        <a:rPr lang="nb-NO" sz="1800" dirty="0">
+                          <a:effectLst/>
+                          <a:latin typeface="Arial" charset="0"/>
+                          <a:ea typeface="Arial" charset="0"/>
+                          <a:cs typeface="Arial" charset="0"/>
+                        </a:rPr>
+                        <a:t>-1.30</a:t>
+                      </a:r>
+                    </a:p>
+                  </a:txBody>
+                  <a:tcPr marL="31750" marR="31750" marT="25400" marB="25400" anchor="ctr">
+                    <a:lnL w="12700" cap="flat" cmpd="sng" algn="ctr">
+                      <a:solidFill>
+                        <a:schemeClr val="tx1"/>
+                      </a:solidFill>
+                      <a:prstDash val="solid"/>
+                      <a:round/>
+                      <a:headEnd type="none" w="med" len="med"/>
+                      <a:tailEnd type="none" w="med" len="med"/>
+                    </a:lnL>
+                    <a:lnR w="12700" cap="flat" cmpd="sng" algn="ctr">
+                      <a:solidFill>
+                        <a:schemeClr val="tx1"/>
+                      </a:solidFill>
+                      <a:prstDash val="solid"/>
+                      <a:round/>
+                      <a:headEnd type="none" w="med" len="med"/>
+                      <a:tailEnd type="none" w="med" len="med"/>
+                    </a:lnR>
+                  </a:tcPr>
+                </a:tc>
+                <a:tc>
+                  <a:txBody>
+                    <a:bodyPr/>
+                    <a:lstStyle/>
+                    <a:p>
+                      <a:pPr algn="ctr"/>
+                      <a:r>
+                        <a:rPr lang="is-IS" sz="1800" dirty="0" smtClean="0">
+                          <a:effectLst/>
+                          <a:latin typeface="Arial" charset="0"/>
+                          <a:ea typeface="Arial" charset="0"/>
+                          <a:cs typeface="Arial" charset="0"/>
+                        </a:rPr>
+                        <a:t>5.36</a:t>
+                      </a:r>
+                      <a:r>
+                        <a:rPr lang="is-IS" sz="1800" baseline="0" dirty="0" smtClean="0">
+                          <a:effectLst/>
+                          <a:latin typeface="Arial" charset="0"/>
+                          <a:ea typeface="Arial" charset="0"/>
+                          <a:cs typeface="Arial" charset="0"/>
+                        </a:rPr>
+                        <a:t> </a:t>
+                      </a:r>
+                      <a:r>
+                        <a:rPr lang="is-IS" sz="1800" dirty="0" smtClean="0">
+                          <a:effectLst/>
+                          <a:latin typeface="Arial" charset="0"/>
+                          <a:ea typeface="Arial" charset="0"/>
+                          <a:cs typeface="Arial" charset="0"/>
+                        </a:rPr>
+                        <a:t>e-134</a:t>
+                      </a:r>
+                      <a:endParaRPr lang="is-IS" sz="1800" dirty="0">
+                        <a:effectLst/>
+                        <a:latin typeface="Arial" charset="0"/>
+                        <a:ea typeface="Arial" charset="0"/>
+                        <a:cs typeface="Arial" charset="0"/>
+                      </a:endParaRPr>
+                    </a:p>
+                  </a:txBody>
+                  <a:tcPr marL="31750" marR="31750" marT="25400" marB="25400" anchor="ctr">
+                    <a:lnL w="12700" cap="flat" cmpd="sng" algn="ctr">
+                      <a:solidFill>
+                        <a:schemeClr val="tx1"/>
+                      </a:solidFill>
+                      <a:prstDash val="solid"/>
+                      <a:round/>
+                      <a:headEnd type="none" w="med" len="med"/>
+                      <a:tailEnd type="none" w="med" len="med"/>
+                    </a:lnL>
+                    <a:lnR w="12700" cap="flat" cmpd="sng" algn="ctr">
+                      <a:solidFill>
+                        <a:schemeClr val="tx1"/>
+                      </a:solidFill>
+                      <a:prstDash val="solid"/>
+                      <a:round/>
+                      <a:headEnd type="none" w="med" len="med"/>
+                      <a:tailEnd type="none" w="med" len="med"/>
+                    </a:lnR>
+                  </a:tcPr>
+                </a:tc>
+                <a:tc>
+                  <a:txBody>
+                    <a:bodyPr/>
+                    <a:lstStyle/>
+                    <a:p>
+                      <a:pPr algn="ctr"/>
+                      <a:r>
+                        <a:rPr lang="hr-HR" sz="1800" dirty="0">
+                          <a:effectLst/>
+                          <a:latin typeface="Arial" charset="0"/>
+                          <a:ea typeface="Arial" charset="0"/>
+                          <a:cs typeface="Arial" charset="0"/>
+                        </a:rPr>
+                        <a:t>7.181</a:t>
+                      </a:r>
+                    </a:p>
+                  </a:txBody>
+                  <a:tcPr marL="31750" marR="31750" marT="25400" marB="25400" anchor="ctr">
+                    <a:lnL w="12700" cap="flat" cmpd="sng" algn="ctr">
+                      <a:solidFill>
+                        <a:schemeClr val="tx1"/>
+                      </a:solidFill>
+                      <a:prstDash val="solid"/>
+                      <a:round/>
+                      <a:headEnd type="none" w="med" len="med"/>
+                      <a:tailEnd type="none" w="med" len="med"/>
+                    </a:lnL>
+                    <a:lnR w="12700" cap="flat" cmpd="sng" algn="ctr">
+                      <a:solidFill>
+                        <a:schemeClr val="tx1"/>
+                      </a:solidFill>
+                      <a:prstDash val="solid"/>
+                      <a:round/>
+                      <a:headEnd type="none" w="med" len="med"/>
+                      <a:tailEnd type="none" w="med" len="med"/>
+                    </a:lnR>
+                  </a:tcPr>
+                </a:tc>
+                <a:tc>
+                  <a:txBody>
+                    <a:bodyPr/>
+                    <a:lstStyle/>
+                    <a:p>
+                      <a:pPr algn="ctr"/>
+                      <a:r>
+                        <a:rPr lang="is-IS" sz="1800" dirty="0" smtClean="0">
+                          <a:effectLst/>
+                          <a:latin typeface="Arial" charset="0"/>
+                          <a:ea typeface="Arial" charset="0"/>
+                          <a:cs typeface="Arial" charset="0"/>
+                        </a:rPr>
+                        <a:t>1.12</a:t>
+                      </a:r>
+                      <a:r>
+                        <a:rPr lang="is-IS" sz="1800" baseline="0" dirty="0" smtClean="0">
+                          <a:effectLst/>
+                          <a:latin typeface="Arial" charset="0"/>
+                          <a:ea typeface="Arial" charset="0"/>
+                          <a:cs typeface="Arial" charset="0"/>
+                        </a:rPr>
+                        <a:t> </a:t>
+                      </a:r>
+                      <a:r>
+                        <a:rPr lang="is-IS" sz="1800" dirty="0" smtClean="0">
+                          <a:effectLst/>
+                          <a:latin typeface="Arial" charset="0"/>
+                          <a:ea typeface="Arial" charset="0"/>
+                          <a:cs typeface="Arial" charset="0"/>
+                        </a:rPr>
+                        <a:t>e-33</a:t>
+                      </a:r>
+                      <a:endParaRPr lang="is-IS" sz="1800" dirty="0">
+                        <a:effectLst/>
+                        <a:latin typeface="Arial" charset="0"/>
+                        <a:ea typeface="Arial" charset="0"/>
+                        <a:cs typeface="Arial" charset="0"/>
+                      </a:endParaRPr>
+                    </a:p>
+                  </a:txBody>
+                  <a:tcPr marL="31750" marR="31750" marT="25400" marB="25400" anchor="ctr">
                     <a:lnL w="12700" cap="flat" cmpd="sng" algn="ctr">
                       <a:solidFill>
                         <a:schemeClr val="tx1"/>
@@ -4036,7 +4216,7 @@
 <file path=ppt/theme/theme1.xml><?xml version="1.0" encoding="utf-8"?>
 <a:theme xmlns:a="http://schemas.openxmlformats.org/drawingml/2006/main" name="Office Theme">
   <a:themeElements>
-    <a:clrScheme name="Office">
+    <a:clrScheme name="Office Theme">
       <a:dk1>
         <a:sysClr val="windowText" lastClr="000000"/>
       </a:dk1>
@@ -4074,14 +4254,14 @@
         <a:srgbClr val="954F72"/>
       </a:folHlink>
     </a:clrScheme>
-    <a:fontScheme name="Office">
+    <a:fontScheme name="Office Theme">
       <a:majorFont>
         <a:latin typeface="Calibri Light" panose="020F0302020204030204"/>
         <a:ea typeface=""/>
         <a:cs typeface=""/>
-        <a:font script="Jpan" typeface="Yu Gothic Light"/>
+        <a:font script="Jpan" typeface="游ゴシック Light"/>
         <a:font script="Hang" typeface="맑은 고딕"/>
-        <a:font script="Hans" typeface="DengXian Light"/>
+        <a:font script="Hans" typeface="等线 Light"/>
         <a:font script="Hant" typeface="新細明體"/>
         <a:font script="Arab" typeface="Times New Roman"/>
         <a:font script="Hebr" typeface="Times New Roman"/>
@@ -4114,9 +4294,9 @@
         <a:latin typeface="Calibri" panose="020F0502020204030204"/>
         <a:ea typeface=""/>
         <a:cs typeface=""/>
-        <a:font script="Jpan" typeface="Yu Gothic"/>
+        <a:font script="Jpan" typeface="游ゴシック"/>
         <a:font script="Hang" typeface="맑은 고딕"/>
-        <a:font script="Hans" typeface="DengXian"/>
+        <a:font script="Hans" typeface="等线"/>
         <a:font script="Hant" typeface="新細明體"/>
         <a:font script="Arab" typeface="Arial"/>
         <a:font script="Hebr" typeface="Arial"/>
@@ -4146,7 +4326,7 @@
         <a:font script="Geor" typeface="Sylfaen"/>
       </a:minorFont>
     </a:fontScheme>
-    <a:fmtScheme name="Office">
+    <a:fmtScheme name="Office Theme">
       <a:fillStyleLst>
         <a:solidFill>
           <a:schemeClr val="phClr"/>

</xml_diff>